<commit_message>
Added the utility function handle.
</commit_message>
<xml_diff>
--- a/doc/result_0404_2019.pptx
+++ b/doc/result_0404_2019.pptx
@@ -5,7 +5,7 @@
     <p:sldMasterId id="2147483660" r:id="rId1"/>
   </p:sldMasterIdLst>
   <p:notesMasterIdLst>
-    <p:notesMasterId r:id="rId17"/>
+    <p:notesMasterId r:id="rId15"/>
   </p:notesMasterIdLst>
   <p:sldIdLst>
     <p:sldId id="256" r:id="rId2"/>
@@ -18,11 +18,9 @@
     <p:sldId id="266" r:id="rId9"/>
     <p:sldId id="265" r:id="rId10"/>
     <p:sldId id="276" r:id="rId11"/>
-    <p:sldId id="271" r:id="rId12"/>
-    <p:sldId id="272" r:id="rId13"/>
-    <p:sldId id="273" r:id="rId14"/>
-    <p:sldId id="274" r:id="rId15"/>
-    <p:sldId id="275" r:id="rId16"/>
+    <p:sldId id="272" r:id="rId12"/>
+    <p:sldId id="273" r:id="rId13"/>
+    <p:sldId id="275" r:id="rId14"/>
   </p:sldIdLst>
   <p:sldSz cx="9144000" cy="6858000" type="letter"/>
   <p:notesSz cx="6858000" cy="9144000"/>
@@ -211,7 +209,7 @@
           <a:p>
             <a:fld id="{95CFC698-6045-E54C-ADAA-98F01D9428B8}" type="datetimeFigureOut">
               <a:rPr lang="en-US" smtClean="0"/>
-              <a:t>8/8/19</a:t>
+              <a:t>8/13/19</a:t>
             </a:fld>
             <a:endParaRPr lang="en-US"/>
           </a:p>
@@ -845,90 +843,6 @@
 </p:notes>
 </file>
 
-<file path=ppt/notesSlides/notesSlide5.xml><?xml version="1.0" encoding="utf-8"?>
-<p:notes xmlns:a="http://schemas.openxmlformats.org/drawingml/2006/main" xmlns:r="http://schemas.openxmlformats.org/officeDocument/2006/relationships" xmlns:p="http://schemas.openxmlformats.org/presentationml/2006/main">
-  <p:cSld>
-    <p:spTree>
-      <p:nvGrpSpPr>
-        <p:cNvPr id="1" name=""/>
-        <p:cNvGrpSpPr/>
-        <p:nvPr/>
-      </p:nvGrpSpPr>
-      <p:grpSpPr>
-        <a:xfrm>
-          <a:off x="0" y="0"/>
-          <a:ext cx="0" cy="0"/>
-          <a:chOff x="0" y="0"/>
-          <a:chExt cx="0" cy="0"/>
-        </a:xfrm>
-      </p:grpSpPr>
-      <p:sp>
-        <p:nvSpPr>
-          <p:cNvPr id="2" name="Slide Image Placeholder 1"/>
-          <p:cNvSpPr>
-            <a:spLocks noGrp="1" noRot="1" noChangeAspect="1"/>
-          </p:cNvSpPr>
-          <p:nvPr>
-            <p:ph type="sldImg"/>
-          </p:nvPr>
-        </p:nvSpPr>
-        <p:spPr/>
-      </p:sp>
-      <p:sp>
-        <p:nvSpPr>
-          <p:cNvPr id="3" name="Notes Placeholder 2"/>
-          <p:cNvSpPr>
-            <a:spLocks noGrp="1"/>
-          </p:cNvSpPr>
-          <p:nvPr>
-            <p:ph type="body" idx="1"/>
-          </p:nvPr>
-        </p:nvSpPr>
-        <p:spPr/>
-        <p:txBody>
-          <a:bodyPr/>
-          <a:lstStyle/>
-          <a:p>
-            <a:endParaRPr lang="en-US" dirty="0"/>
-          </a:p>
-        </p:txBody>
-      </p:sp>
-      <p:sp>
-        <p:nvSpPr>
-          <p:cNvPr id="4" name="Slide Number Placeholder 3"/>
-          <p:cNvSpPr>
-            <a:spLocks noGrp="1"/>
-          </p:cNvSpPr>
-          <p:nvPr>
-            <p:ph type="sldNum" sz="quarter" idx="5"/>
-          </p:nvPr>
-        </p:nvSpPr>
-        <p:spPr/>
-        <p:txBody>
-          <a:bodyPr/>
-          <a:lstStyle/>
-          <a:p>
-            <a:fld id="{AA109745-F71C-A340-8D0C-65AACD618045}" type="slidenum">
-              <a:rPr lang="en-US" smtClean="0"/>
-              <a:t>11</a:t>
-            </a:fld>
-            <a:endParaRPr lang="en-US"/>
-          </a:p>
-        </p:txBody>
-      </p:sp>
-    </p:spTree>
-    <p:extLst>
-      <p:ext uri="{BB962C8B-B14F-4D97-AF65-F5344CB8AC3E}">
-        <p14:creationId xmlns:p14="http://schemas.microsoft.com/office/powerpoint/2010/main" val="3242587699"/>
-      </p:ext>
-    </p:extLst>
-  </p:cSld>
-  <p:clrMapOvr>
-    <a:masterClrMapping/>
-  </p:clrMapOvr>
-</p:notes>
-</file>
-
 <file path=ppt/slideLayouts/slideLayout1.xml><?xml version="1.0" encoding="utf-8"?>
 <p:sldLayout xmlns:a="http://schemas.openxmlformats.org/drawingml/2006/main" xmlns:r="http://schemas.openxmlformats.org/officeDocument/2006/relationships" xmlns:p="http://schemas.openxmlformats.org/presentationml/2006/main" type="title" preserve="1">
   <p:cSld name="Title Slide">
@@ -1060,7 +974,7 @@
           <a:p>
             <a:fld id="{D83CE7CA-FC5D-A143-9604-17C710325B9A}" type="datetimeFigureOut">
               <a:rPr lang="en-US" smtClean="0"/>
-              <a:t>8/8/19</a:t>
+              <a:t>8/13/19</a:t>
             </a:fld>
             <a:endParaRPr lang="en-US"/>
           </a:p>
@@ -1230,7 +1144,7 @@
           <a:p>
             <a:fld id="{D83CE7CA-FC5D-A143-9604-17C710325B9A}" type="datetimeFigureOut">
               <a:rPr lang="en-US" smtClean="0"/>
-              <a:t>8/8/19</a:t>
+              <a:t>8/13/19</a:t>
             </a:fld>
             <a:endParaRPr lang="en-US"/>
           </a:p>
@@ -1410,7 +1324,7 @@
           <a:p>
             <a:fld id="{D83CE7CA-FC5D-A143-9604-17C710325B9A}" type="datetimeFigureOut">
               <a:rPr lang="en-US" smtClean="0"/>
-              <a:t>8/8/19</a:t>
+              <a:t>8/13/19</a:t>
             </a:fld>
             <a:endParaRPr lang="en-US"/>
           </a:p>
@@ -1580,7 +1494,7 @@
           <a:p>
             <a:fld id="{D83CE7CA-FC5D-A143-9604-17C710325B9A}" type="datetimeFigureOut">
               <a:rPr lang="en-US" smtClean="0"/>
-              <a:t>8/8/19</a:t>
+              <a:t>8/13/19</a:t>
             </a:fld>
             <a:endParaRPr lang="en-US"/>
           </a:p>
@@ -1824,7 +1738,7 @@
           <a:p>
             <a:fld id="{D83CE7CA-FC5D-A143-9604-17C710325B9A}" type="datetimeFigureOut">
               <a:rPr lang="en-US" smtClean="0"/>
-              <a:t>8/8/19</a:t>
+              <a:t>8/13/19</a:t>
             </a:fld>
             <a:endParaRPr lang="en-US"/>
           </a:p>
@@ -2056,7 +1970,7 @@
           <a:p>
             <a:fld id="{D83CE7CA-FC5D-A143-9604-17C710325B9A}" type="datetimeFigureOut">
               <a:rPr lang="en-US" smtClean="0"/>
-              <a:t>8/8/19</a:t>
+              <a:t>8/13/19</a:t>
             </a:fld>
             <a:endParaRPr lang="en-US"/>
           </a:p>
@@ -2423,7 +2337,7 @@
           <a:p>
             <a:fld id="{D83CE7CA-FC5D-A143-9604-17C710325B9A}" type="datetimeFigureOut">
               <a:rPr lang="en-US" smtClean="0"/>
-              <a:t>8/8/19</a:t>
+              <a:t>8/13/19</a:t>
             </a:fld>
             <a:endParaRPr lang="en-US"/>
           </a:p>
@@ -2541,7 +2455,7 @@
           <a:p>
             <a:fld id="{D83CE7CA-FC5D-A143-9604-17C710325B9A}" type="datetimeFigureOut">
               <a:rPr lang="en-US" smtClean="0"/>
-              <a:t>8/8/19</a:t>
+              <a:t>8/13/19</a:t>
             </a:fld>
             <a:endParaRPr lang="en-US"/>
           </a:p>
@@ -2636,7 +2550,7 @@
           <a:p>
             <a:fld id="{D83CE7CA-FC5D-A143-9604-17C710325B9A}" type="datetimeFigureOut">
               <a:rPr lang="en-US" smtClean="0"/>
-              <a:t>8/8/19</a:t>
+              <a:t>8/13/19</a:t>
             </a:fld>
             <a:endParaRPr lang="en-US"/>
           </a:p>
@@ -2913,7 +2827,7 @@
           <a:p>
             <a:fld id="{D83CE7CA-FC5D-A143-9604-17C710325B9A}" type="datetimeFigureOut">
               <a:rPr lang="en-US" smtClean="0"/>
-              <a:t>8/8/19</a:t>
+              <a:t>8/13/19</a:t>
             </a:fld>
             <a:endParaRPr lang="en-US"/>
           </a:p>
@@ -3170,7 +3084,7 @@
           <a:p>
             <a:fld id="{D83CE7CA-FC5D-A143-9604-17C710325B9A}" type="datetimeFigureOut">
               <a:rPr lang="en-US" smtClean="0"/>
-              <a:t>8/8/19</a:t>
+              <a:t>8/13/19</a:t>
             </a:fld>
             <a:endParaRPr lang="en-US"/>
           </a:p>
@@ -3383,7 +3297,7 @@
           <a:p>
             <a:fld id="{D83CE7CA-FC5D-A143-9604-17C710325B9A}" type="datetimeFigureOut">
               <a:rPr lang="en-US" smtClean="0"/>
-              <a:t>8/8/19</a:t>
+              <a:t>8/13/19</a:t>
             </a:fld>
             <a:endParaRPr lang="en-US"/>
           </a:p>
@@ -3938,8 +3852,8 @@
         </p:nvSpPr>
         <p:spPr>
           <a:xfrm>
-            <a:off x="520700" y="177800"/>
-            <a:ext cx="7493000" cy="6032421"/>
+            <a:off x="520700" y="115044"/>
+            <a:ext cx="7493000" cy="6463308"/>
           </a:xfrm>
           <a:prstGeom prst="rect">
             <a:avLst/>
@@ -3987,7 +3901,7 @@
             </a:r>
             <a:r>
               <a:rPr lang="en-US" sz="1400" dirty="0"/>
-              <a:t>', 0, '</a:t>
+              <a:t>', 1, '</a:t>
             </a:r>
             <a:r>
               <a:rPr lang="en-US" sz="1400" dirty="0" err="1"/>
@@ -3995,7 +3909,7 @@
             </a:r>
             <a:r>
               <a:rPr lang="en-US" sz="1400" dirty="0"/>
-              <a:t>', 0, '</a:t>
+              <a:t>', 1, '</a:t>
             </a:r>
             <a:r>
               <a:rPr lang="en-US" sz="1400" dirty="0" err="1"/>
@@ -4003,7 +3917,7 @@
             </a:r>
             <a:r>
               <a:rPr lang="en-US" sz="1400" dirty="0"/>
-              <a:t>', 10);</a:t>
+              <a:t>', 30);</a:t>
             </a:r>
           </a:p>
           <a:p>
@@ -4039,7 +3953,7 @@
             </a:r>
             <a:r>
               <a:rPr lang="en-US" sz="1400" dirty="0"/>
-              <a:t> = 0</a:t>
+              <a:t> = 1</a:t>
             </a:r>
           </a:p>
           <a:p>
@@ -4049,7 +3963,7 @@
             </a:r>
             <a:r>
               <a:rPr lang="en-US" sz="1400" dirty="0"/>
-              <a:t> = 0</a:t>
+              <a:t> = 1</a:t>
             </a:r>
           </a:p>
           <a:p>
@@ -4065,184 +3979,159 @@
             </a:r>
             <a:r>
               <a:rPr lang="en-US" sz="1400" dirty="0"/>
-              <a:t> =  10.00</a:t>
-            </a:r>
-          </a:p>
-          <a:p>
-            <a:r>
-              <a:rPr lang="en-US" sz="1400" dirty="0" err="1"/>
-              <a:t>Obj</a:t>
-            </a:r>
+              <a:t> =  30.00</a:t>
+            </a:r>
+          </a:p>
+          <a:p>
             <a:r>
               <a:rPr lang="en-US" sz="1400" dirty="0"/>
-              <a:t> </a:t>
-            </a:r>
-            <a:r>
-              <a:rPr lang="en-US" sz="1400" dirty="0" err="1"/>
-              <a:t>Func</a:t>
-            </a:r>
-            <a:r>
-              <a:rPr lang="en-US" sz="1400" dirty="0"/>
-              <a:t> 	 Norm J 	 Damping Param 	 Residual 	 Diffusion Coefficients</a:t>
-            </a:r>
-          </a:p>
-          <a:p>
-            <a:r>
-              <a:rPr lang="en-US" sz="1400" dirty="0"/>
-              <a:t>   </a:t>
+              <a:t>Function test(): </a:t>
             </a:r>
             <a:r>
               <a:rPr lang="en-US" sz="1400" dirty="0">
-                <a:highlight>
-                  <a:srgbClr val="FFFF00"/>
-                </a:highlight>
-              </a:rPr>
-              <a:t>0.000</a:t>
-            </a:r>
-            <a:r>
-              <a:rPr lang="en-US" sz="1400" dirty="0"/>
-              <a:t> 	    0.67901 	 0.00e+00 	 0.00e+00 	 0.1586 </a:t>
-            </a:r>
-          </a:p>
-          <a:p>
-            <a:r>
-              <a:rPr lang="en-US" sz="1400" dirty="0"/>
-              <a:t>   1.384 	    0.01003 	 1.00e+00 	 3.65e-01 	 0.14654 </a:t>
-            </a:r>
-          </a:p>
-          <a:p>
-            <a:r>
-              <a:rPr lang="en-US" sz="1400" dirty="0"/>
-              <a:t>   1.339 	    0.00781 	 1.00e+00 	 4.57e-01 	 0.15343 </a:t>
-            </a:r>
-          </a:p>
-          <a:p>
-            <a:r>
-              <a:rPr lang="en-US" sz="1400" dirty="0"/>
-              <a:t>   1.376 	    0.00010 	 1.00e+00 	 4.63e-01 	 0.15357 </a:t>
-            </a:r>
-          </a:p>
-          <a:p>
-            <a:r>
-              <a:rPr lang="en-US" sz="1400" dirty="0"/>
-              <a:t>Number of newton steps: 4 </a:t>
-            </a:r>
-          </a:p>
-          <a:p>
-            <a:r>
-              <a:rPr lang="en-US" sz="1400" dirty="0"/>
-              <a:t>######################## </a:t>
-            </a:r>
-          </a:p>
-          <a:p>
-            <a:endParaRPr lang="en-US" sz="1400" dirty="0"/>
-          </a:p>
-          <a:p>
-            <a:r>
-              <a:rPr lang="en-US" sz="1400" dirty="0" err="1"/>
-              <a:t>Obj</a:t>
-            </a:r>
-            <a:r>
-              <a:rPr lang="en-US" sz="1400" dirty="0"/>
-              <a:t> </a:t>
-            </a:r>
-            <a:r>
-              <a:rPr lang="en-US" sz="1400" dirty="0" err="1"/>
-              <a:t>Func</a:t>
-            </a:r>
-            <a:r>
-              <a:rPr lang="en-US" sz="1400" dirty="0"/>
-              <a:t> 	 Norm J 	 Damping Param 	 Residual 	 Diffusion Coefficients</a:t>
-            </a:r>
-          </a:p>
-          <a:p>
-            <a:r>
-              <a:rPr lang="en-US" sz="1400" dirty="0"/>
-              <a:t>   0.000 	    0.01009 	 0.00e+00 	 0.00e+00 	 </a:t>
-            </a:r>
-            <a:r>
-              <a:rPr lang="en-US" sz="1400" dirty="0">
-                <a:highlight>
-                  <a:srgbClr val="FFFF00"/>
-                </a:highlight>
-              </a:rPr>
-              <a:t>0.14628</a:t>
-            </a:r>
-            <a:r>
-              <a:rPr lang="en-US" sz="1400" dirty="0"/>
-              <a:t> </a:t>
-            </a:r>
-          </a:p>
-          <a:p>
-            <a:r>
-              <a:rPr lang="en-US" sz="1400" dirty="0"/>
-              <a:t>   1.336 	    0.00854 	 1.00e+00 	 4.60e-01 	 0.15334 </a:t>
-            </a:r>
-          </a:p>
-          <a:p>
-            <a:r>
-              <a:rPr lang="en-US" sz="1400" dirty="0"/>
-              <a:t>   1.375 	    0.00006 	 1.00e+00 	 4.63e-01 	 0.15345 </a:t>
-            </a:r>
-          </a:p>
-          <a:p>
-            <a:r>
-              <a:rPr lang="en-US" sz="1400" dirty="0"/>
-              <a:t>Number of newton steps: 3 </a:t>
-            </a:r>
-          </a:p>
-          <a:p>
-            <a:r>
-              <a:rPr lang="en-US" sz="1400" dirty="0"/>
-              <a:t>######################## </a:t>
-            </a:r>
-          </a:p>
-          <a:p>
-            <a:endParaRPr lang="en-US" sz="1400" dirty="0"/>
-          </a:p>
-          <a:p>
-            <a:r>
-              <a:rPr lang="en-US" sz="1400" dirty="0"/>
-              <a:t>Elapsed time is 1.482838 seconds.</a:t>
-            </a:r>
-          </a:p>
-        </p:txBody>
-      </p:sp>
-      <p:sp>
-        <p:nvSpPr>
-          <p:cNvPr id="3" name="TextBox 2">
-            <a:extLst>
-              <a:ext uri="{FF2B5EF4-FFF2-40B4-BE49-F238E27FC236}">
-                <a16:creationId xmlns:a16="http://schemas.microsoft.com/office/drawing/2014/main" id="{BEB40056-D4C2-F74E-825E-A86033DDB618}"/>
-              </a:ext>
-            </a:extLst>
-          </p:cNvPr>
-          <p:cNvSpPr txBox="1"/>
-          <p:nvPr/>
-        </p:nvSpPr>
-        <p:spPr>
-          <a:xfrm>
-            <a:off x="6985000" y="4559300"/>
-            <a:ext cx="1536700" cy="369332"/>
-          </a:xfrm>
-          <a:prstGeom prst="rect">
-            <a:avLst/>
-          </a:prstGeom>
-          <a:noFill/>
-        </p:spPr>
-        <p:txBody>
-          <a:bodyPr wrap="square" rtlCol="0">
-            <a:spAutoFit/>
-          </a:bodyPr>
-          <a:lstStyle/>
-          <a:p>
-            <a:r>
-              <a:rPr lang="en-US" dirty="0">
                 <a:solidFill>
                   <a:srgbClr val="FF0000"/>
                 </a:solidFill>
               </a:rPr>
-              <a:t>Strange here</a:t>
+              <a:t>Set </a:t>
+            </a:r>
+            <a:r>
+              <a:rPr lang="en-US" sz="1400" dirty="0" err="1">
+                <a:solidFill>
+                  <a:srgbClr val="FF0000"/>
+                </a:solidFill>
+              </a:rPr>
+              <a:t>update_option</a:t>
+            </a:r>
+            <a:r>
+              <a:rPr lang="en-US" sz="1400" dirty="0">
+                <a:solidFill>
+                  <a:srgbClr val="FF0000"/>
+                </a:solidFill>
+              </a:rPr>
+              <a:t> = 2 ---</a:t>
+            </a:r>
+          </a:p>
+          <a:p>
+            <a:endParaRPr lang="en-US" sz="1400" dirty="0"/>
+          </a:p>
+          <a:p>
+            <a:r>
+              <a:rPr lang="en-US" sz="1400" dirty="0"/>
+              <a:t>--- test case 5: </a:t>
+            </a:r>
+            <a:r>
+              <a:rPr lang="en-US" sz="1400" dirty="0" err="1"/>
+              <a:t>scale_by_magnification</a:t>
+            </a:r>
+            <a:r>
+              <a:rPr lang="en-US" sz="1400" dirty="0"/>
+              <a:t> of 98. --- </a:t>
+            </a:r>
+          </a:p>
+          <a:p>
+            <a:endParaRPr lang="en-US" sz="1400" dirty="0"/>
+          </a:p>
+          <a:p>
+            <a:r>
+              <a:rPr lang="en-US" sz="1400" dirty="0" err="1"/>
+              <a:t>Obj</a:t>
+            </a:r>
+            <a:r>
+              <a:rPr lang="en-US" sz="1400" dirty="0"/>
+              <a:t> </a:t>
+            </a:r>
+            <a:r>
+              <a:rPr lang="en-US" sz="1400" dirty="0" err="1"/>
+              <a:t>Func</a:t>
+            </a:r>
+            <a:r>
+              <a:rPr lang="en-US" sz="1400" dirty="0"/>
+              <a:t> 	 Norm J 	 Damping 	 Residual 	 Diffusion Coefficients</a:t>
+            </a:r>
+          </a:p>
+          <a:p>
+            <a:r>
+              <a:rPr lang="en-US" sz="1400" dirty="0"/>
+              <a:t>0.000e+00 	  4.265e+01 	 0.00e+00 	 0.00e+00 	 0.15558 </a:t>
+            </a:r>
+          </a:p>
+          <a:p>
+            <a:r>
+              <a:rPr lang="en-US" sz="1400" dirty="0"/>
+              <a:t>1.722e+00 	  2.080e-01 	 1.00e+00 	 7.63e+00 	 0.14611 </a:t>
+            </a:r>
+          </a:p>
+          <a:p>
+            <a:r>
+              <a:rPr lang="en-US" sz="1400" dirty="0"/>
+              <a:t>1.664e+00 	  1.537e-02 	 1.00e+00 	 9.59e+00 	 0.15332 </a:t>
+            </a:r>
+          </a:p>
+          <a:p>
+            <a:r>
+              <a:rPr lang="en-US" sz="1400" dirty="0"/>
+              <a:t>1.713e+00 	  5.948e-04 	 1.00e+00 	 9.68e+00 	 0.15344 </a:t>
+            </a:r>
+          </a:p>
+          <a:p>
+            <a:r>
+              <a:rPr lang="en-US" sz="1400" dirty="0"/>
+              <a:t>Number of newton steps: 4 </a:t>
+            </a:r>
+          </a:p>
+          <a:p>
+            <a:r>
+              <a:rPr lang="en-US" sz="1400" dirty="0"/>
+              <a:t>######################## </a:t>
+            </a:r>
+          </a:p>
+          <a:p>
+            <a:endParaRPr lang="en-US" sz="1400" dirty="0"/>
+          </a:p>
+          <a:p>
+            <a:r>
+              <a:rPr lang="en-US" sz="1400" dirty="0" err="1"/>
+              <a:t>Obj</a:t>
+            </a:r>
+            <a:r>
+              <a:rPr lang="en-US" sz="1400" dirty="0"/>
+              <a:t> </a:t>
+            </a:r>
+            <a:r>
+              <a:rPr lang="en-US" sz="1400" dirty="0" err="1"/>
+              <a:t>Func</a:t>
+            </a:r>
+            <a:r>
+              <a:rPr lang="en-US" sz="1400" dirty="0"/>
+              <a:t> 	 Norm J 	 Damping 	 Residual 	 Diffusion Coefficients</a:t>
+            </a:r>
+          </a:p>
+          <a:p>
+            <a:r>
+              <a:rPr lang="en-US" sz="1400" dirty="0"/>
+              <a:t>1.713e+00 	  4.798e-07 	 0.00e+00 	 9.68e+00 	 0.15344 </a:t>
+            </a:r>
+          </a:p>
+          <a:p>
+            <a:r>
+              <a:rPr lang="en-US" sz="1400" dirty="0"/>
+              <a:t>Number of newton steps: 1 </a:t>
+            </a:r>
+          </a:p>
+          <a:p>
+            <a:r>
+              <a:rPr lang="en-US" sz="1400" dirty="0"/>
+              <a:t>######################## </a:t>
+            </a:r>
+          </a:p>
+          <a:p>
+            <a:endParaRPr lang="en-US" sz="1400" dirty="0"/>
+          </a:p>
+          <a:p>
+            <a:r>
+              <a:rPr lang="en-US" sz="1400" dirty="0"/>
+              <a:t>Elapsed time is 1.039142 seconds. </a:t>
             </a:r>
           </a:p>
         </p:txBody>
@@ -4281,7 +4170,80 @@
                   <a:srgbClr val="FF0000"/>
                 </a:solidFill>
               </a:rPr>
-              <a:t>Converged to 0.1535 um^2/s, while it was 0.11 um^2/s in the paper. 1/16 pixel/um was used. (Now 1/6.4 pixel/um)  </a:t>
+              <a:t>Converged to 0.1544 um^2/s, while it was 0.11 um^2/s in the paper. 1/16 pixel/um was used. (Now 1/6.4 pixel/um)  </a:t>
+            </a:r>
+          </a:p>
+        </p:txBody>
+      </p:sp>
+      <p:sp>
+        <p:nvSpPr>
+          <p:cNvPr id="6" name="TextBox 5">
+            <a:extLst>
+              <a:ext uri="{FF2B5EF4-FFF2-40B4-BE49-F238E27FC236}">
+                <a16:creationId xmlns:a16="http://schemas.microsoft.com/office/drawing/2014/main" id="{A73F1789-D211-7C4A-BFDB-CE4BDED3DE29}"/>
+              </a:ext>
+            </a:extLst>
+          </p:cNvPr>
+          <p:cNvSpPr txBox="1"/>
+          <p:nvPr/>
+        </p:nvSpPr>
+        <p:spPr>
+          <a:xfrm>
+            <a:off x="4686300" y="1308100"/>
+            <a:ext cx="4114800" cy="1200329"/>
+          </a:xfrm>
+          <a:prstGeom prst="rect">
+            <a:avLst/>
+          </a:prstGeom>
+          <a:noFill/>
+        </p:spPr>
+        <p:txBody>
+          <a:bodyPr wrap="square" rtlCol="0">
+            <a:spAutoFit/>
+          </a:bodyPr>
+          <a:lstStyle/>
+          <a:p>
+            <a:pPr marL="342900" indent="-342900">
+              <a:buFont typeface="+mj-lt"/>
+              <a:buAutoNum type="arabicPeriod"/>
+            </a:pPr>
+            <a:r>
+              <a:rPr lang="en-US" dirty="0">
+                <a:solidFill>
+                  <a:srgbClr val="FF0000"/>
+                </a:solidFill>
+              </a:rPr>
+              <a:t>Initial </a:t>
+            </a:r>
+            <a:r>
+              <a:rPr lang="en-US" dirty="0" err="1">
+                <a:solidFill>
+                  <a:srgbClr val="FF0000"/>
+                </a:solidFill>
+              </a:rPr>
+              <a:t>obj</a:t>
+            </a:r>
+            <a:r>
+              <a:rPr lang="en-US" dirty="0">
+                <a:solidFill>
+                  <a:srgbClr val="FF0000"/>
+                </a:solidFill>
+              </a:rPr>
+              <a:t> is zero because of the initial guess. </a:t>
+            </a:r>
+          </a:p>
+          <a:p>
+            <a:pPr marL="342900" indent="-342900">
+              <a:buFont typeface="+mj-lt"/>
+              <a:buAutoNum type="arabicPeriod"/>
+            </a:pPr>
+            <a:r>
+              <a:rPr lang="en-US" dirty="0">
+                <a:solidFill>
+                  <a:srgbClr val="FF0000"/>
+                </a:solidFill>
+              </a:rPr>
+              <a:t>Updating u, v, and d in outer iterations increase stability. </a:t>
             </a:r>
           </a:p>
         </p:txBody>
@@ -4316,367 +4278,6 @@
           <a:chExt cx="0" cy="0"/>
         </a:xfrm>
       </p:grpSpPr>
-      <p:pic>
-        <p:nvPicPr>
-          <p:cNvPr id="2" name="Picture 1">
-            <a:extLst>
-              <a:ext uri="{FF2B5EF4-FFF2-40B4-BE49-F238E27FC236}">
-                <a16:creationId xmlns:a16="http://schemas.microsoft.com/office/drawing/2014/main" id="{4F3D4ED8-8EA3-2C44-B70B-D39766813F7B}"/>
-              </a:ext>
-            </a:extLst>
-          </p:cNvPr>
-          <p:cNvPicPr>
-            <a:picLocks noChangeAspect="1"/>
-          </p:cNvPicPr>
-          <p:nvPr/>
-        </p:nvPicPr>
-        <p:blipFill>
-          <a:blip r:embed="rId3"/>
-          <a:stretch>
-            <a:fillRect/>
-          </a:stretch>
-        </p:blipFill>
-        <p:spPr>
-          <a:xfrm>
-            <a:off x="159740" y="968950"/>
-            <a:ext cx="6235700" cy="1651000"/>
-          </a:xfrm>
-          <a:prstGeom prst="rect">
-            <a:avLst/>
-          </a:prstGeom>
-        </p:spPr>
-      </p:pic>
-      <p:sp>
-        <p:nvSpPr>
-          <p:cNvPr id="3" name="TextBox 2">
-            <a:extLst>
-              <a:ext uri="{FF2B5EF4-FFF2-40B4-BE49-F238E27FC236}">
-                <a16:creationId xmlns:a16="http://schemas.microsoft.com/office/drawing/2014/main" id="{E24E673F-BC05-BE45-96B8-8A51FA2190B2}"/>
-              </a:ext>
-            </a:extLst>
-          </p:cNvPr>
-          <p:cNvSpPr txBox="1"/>
-          <p:nvPr/>
-        </p:nvSpPr>
-        <p:spPr>
-          <a:xfrm>
-            <a:off x="0" y="68719"/>
-            <a:ext cx="8573985" cy="1200329"/>
-          </a:xfrm>
-          <a:prstGeom prst="rect">
-            <a:avLst/>
-          </a:prstGeom>
-          <a:noFill/>
-        </p:spPr>
-        <p:txBody>
-          <a:bodyPr wrap="square" rtlCol="0">
-            <a:spAutoFit/>
-          </a:bodyPr>
-          <a:lstStyle/>
-          <a:p>
-            <a:r>
-              <a:rPr lang="en-US" dirty="0"/>
-              <a:t>04/12/19: For mem17, scale p by magnification: 1/6.4</a:t>
-            </a:r>
-          </a:p>
-          <a:p>
-            <a:r>
-              <a:rPr lang="en-US" dirty="0"/>
-              <a:t>&gt;&gt; test('</a:t>
-            </a:r>
-            <a:r>
-              <a:rPr lang="en-US" dirty="0" err="1"/>
-              <a:t>test_case</a:t>
-            </a:r>
-            <a:r>
-              <a:rPr lang="en-US" dirty="0"/>
-              <a:t>', 5, '</a:t>
-            </a:r>
-            <a:r>
-              <a:rPr lang="en-US" dirty="0" err="1"/>
-              <a:t>init_u_tag</a:t>
-            </a:r>
-            <a:r>
-              <a:rPr lang="en-US" dirty="0"/>
-              <a:t>', 2, ...</a:t>
-            </a:r>
-          </a:p>
-          <a:p>
-            <a:r>
-              <a:rPr lang="en-US" dirty="0"/>
-              <a:t>'</a:t>
-            </a:r>
-            <a:r>
-              <a:rPr lang="en-US" dirty="0" err="1"/>
-              <a:t>enable_normalize</a:t>
-            </a:r>
-            <a:r>
-              <a:rPr lang="en-US" dirty="0"/>
-              <a:t>', 1, '</a:t>
-            </a:r>
-            <a:r>
-              <a:rPr lang="en-US" dirty="0" err="1"/>
-              <a:t>enable_damp_newton</a:t>
-            </a:r>
-            <a:r>
-              <a:rPr lang="en-US" dirty="0"/>
-              <a:t>', 1, 'gamma', 1.0e-5, '</a:t>
-            </a:r>
-            <a:r>
-              <a:rPr lang="en-US" dirty="0" err="1"/>
-              <a:t>init_d</a:t>
-            </a:r>
-            <a:r>
-              <a:rPr lang="en-US" dirty="0"/>
-              <a:t>', 10);</a:t>
-            </a:r>
-          </a:p>
-          <a:p>
-            <a:endParaRPr lang="en-US" dirty="0"/>
-          </a:p>
-        </p:txBody>
-      </p:sp>
-      <p:sp>
-        <p:nvSpPr>
-          <p:cNvPr id="5" name="TextBox 4">
-            <a:extLst>
-              <a:ext uri="{FF2B5EF4-FFF2-40B4-BE49-F238E27FC236}">
-                <a16:creationId xmlns:a16="http://schemas.microsoft.com/office/drawing/2014/main" id="{725DE950-D5D1-BE4B-BB57-D2BB191C4E39}"/>
-              </a:ext>
-            </a:extLst>
-          </p:cNvPr>
-          <p:cNvSpPr txBox="1"/>
-          <p:nvPr/>
-        </p:nvSpPr>
-        <p:spPr>
-          <a:xfrm>
-            <a:off x="159740" y="2619303"/>
-            <a:ext cx="4450321" cy="369332"/>
-          </a:xfrm>
-          <a:prstGeom prst="rect">
-            <a:avLst/>
-          </a:prstGeom>
-          <a:noFill/>
-        </p:spPr>
-        <p:txBody>
-          <a:bodyPr wrap="none" rtlCol="0">
-            <a:spAutoFit/>
-          </a:bodyPr>
-          <a:lstStyle/>
-          <a:p>
-            <a:r>
-              <a:rPr lang="en-US" dirty="0" err="1"/>
-              <a:t>scale_by_magnification</a:t>
-            </a:r>
-            <a:r>
-              <a:rPr lang="en-US" dirty="0"/>
-              <a:t>(</a:t>
-            </a:r>
-            <a:r>
-              <a:rPr lang="en-US" dirty="0" err="1"/>
-              <a:t>p_old</a:t>
-            </a:r>
-            <a:r>
-              <a:rPr lang="en-US" dirty="0"/>
-              <a:t>, magnification)</a:t>
-            </a:r>
-          </a:p>
-        </p:txBody>
-      </p:sp>
-      <p:pic>
-        <p:nvPicPr>
-          <p:cNvPr id="6" name="Picture 5">
-            <a:extLst>
-              <a:ext uri="{FF2B5EF4-FFF2-40B4-BE49-F238E27FC236}">
-                <a16:creationId xmlns:a16="http://schemas.microsoft.com/office/drawing/2014/main" id="{DA31097D-4064-FE47-855A-C7145E23E468}"/>
-              </a:ext>
-            </a:extLst>
-          </p:cNvPr>
-          <p:cNvPicPr>
-            <a:picLocks noChangeAspect="1"/>
-          </p:cNvPicPr>
-          <p:nvPr/>
-        </p:nvPicPr>
-        <p:blipFill>
-          <a:blip r:embed="rId4"/>
-          <a:stretch>
-            <a:fillRect/>
-          </a:stretch>
-        </p:blipFill>
-        <p:spPr>
-          <a:xfrm>
-            <a:off x="159740" y="2994740"/>
-            <a:ext cx="5006026" cy="2300563"/>
-          </a:xfrm>
-          <a:prstGeom prst="rect">
-            <a:avLst/>
-          </a:prstGeom>
-        </p:spPr>
-      </p:pic>
-      <p:sp>
-        <p:nvSpPr>
-          <p:cNvPr id="7" name="Rectangle 6">
-            <a:extLst>
-              <a:ext uri="{FF2B5EF4-FFF2-40B4-BE49-F238E27FC236}">
-                <a16:creationId xmlns:a16="http://schemas.microsoft.com/office/drawing/2014/main" id="{7733C267-786D-5B4F-A031-D68D2A6EF7A6}"/>
-              </a:ext>
-            </a:extLst>
-          </p:cNvPr>
-          <p:cNvSpPr/>
-          <p:nvPr/>
-        </p:nvSpPr>
-        <p:spPr>
-          <a:xfrm>
-            <a:off x="2318369" y="4260408"/>
-            <a:ext cx="688768" cy="403761"/>
-          </a:xfrm>
-          <a:prstGeom prst="rect">
-            <a:avLst/>
-          </a:prstGeom>
-          <a:noFill/>
-          <a:ln>
-            <a:solidFill>
-              <a:srgbClr val="FF0000"/>
-            </a:solidFill>
-          </a:ln>
-        </p:spPr>
-        <p:style>
-          <a:lnRef idx="2">
-            <a:schemeClr val="accent1">
-              <a:shade val="50000"/>
-            </a:schemeClr>
-          </a:lnRef>
-          <a:fillRef idx="1">
-            <a:schemeClr val="accent1"/>
-          </a:fillRef>
-          <a:effectRef idx="0">
-            <a:schemeClr val="accent1"/>
-          </a:effectRef>
-          <a:fontRef idx="minor">
-            <a:schemeClr val="lt1"/>
-          </a:fontRef>
-        </p:style>
-        <p:txBody>
-          <a:bodyPr rtlCol="0" anchor="ctr"/>
-          <a:lstStyle/>
-          <a:p>
-            <a:pPr algn="ctr"/>
-            <a:endParaRPr lang="en-US"/>
-          </a:p>
-        </p:txBody>
-      </p:sp>
-      <p:pic>
-        <p:nvPicPr>
-          <p:cNvPr id="8" name="Picture 7">
-            <a:extLst>
-              <a:ext uri="{FF2B5EF4-FFF2-40B4-BE49-F238E27FC236}">
-                <a16:creationId xmlns:a16="http://schemas.microsoft.com/office/drawing/2014/main" id="{2BC65896-F41E-0E4F-A24B-B2509537C4E1}"/>
-              </a:ext>
-            </a:extLst>
-          </p:cNvPr>
-          <p:cNvPicPr>
-            <a:picLocks noChangeAspect="1"/>
-          </p:cNvPicPr>
-          <p:nvPr/>
-        </p:nvPicPr>
-        <p:blipFill>
-          <a:blip r:embed="rId5"/>
-          <a:stretch>
-            <a:fillRect/>
-          </a:stretch>
-        </p:blipFill>
-        <p:spPr>
-          <a:xfrm>
-            <a:off x="159740" y="5366881"/>
-            <a:ext cx="3149600" cy="1422400"/>
-          </a:xfrm>
-          <a:prstGeom prst="rect">
-            <a:avLst/>
-          </a:prstGeom>
-        </p:spPr>
-      </p:pic>
-      <p:sp>
-        <p:nvSpPr>
-          <p:cNvPr id="9" name="Rectangle 8">
-            <a:extLst>
-              <a:ext uri="{FF2B5EF4-FFF2-40B4-BE49-F238E27FC236}">
-                <a16:creationId xmlns:a16="http://schemas.microsoft.com/office/drawing/2014/main" id="{2D89B272-9F16-D841-8142-B1BD1FFF151B}"/>
-              </a:ext>
-            </a:extLst>
-          </p:cNvPr>
-          <p:cNvSpPr/>
-          <p:nvPr/>
-        </p:nvSpPr>
-        <p:spPr>
-          <a:xfrm>
-            <a:off x="1696131" y="5334716"/>
-            <a:ext cx="1311005" cy="403761"/>
-          </a:xfrm>
-          <a:prstGeom prst="rect">
-            <a:avLst/>
-          </a:prstGeom>
-          <a:noFill/>
-          <a:ln>
-            <a:solidFill>
-              <a:srgbClr val="FF0000"/>
-            </a:solidFill>
-          </a:ln>
-        </p:spPr>
-        <p:style>
-          <a:lnRef idx="2">
-            <a:schemeClr val="accent1">
-              <a:shade val="50000"/>
-            </a:schemeClr>
-          </a:lnRef>
-          <a:fillRef idx="1">
-            <a:schemeClr val="accent1"/>
-          </a:fillRef>
-          <a:effectRef idx="0">
-            <a:schemeClr val="accent1"/>
-          </a:effectRef>
-          <a:fontRef idx="minor">
-            <a:schemeClr val="lt1"/>
-          </a:fontRef>
-        </p:style>
-        <p:txBody>
-          <a:bodyPr rtlCol="0" anchor="ctr"/>
-          <a:lstStyle/>
-          <a:p>
-            <a:pPr algn="ctr"/>
-            <a:endParaRPr lang="en-US"/>
-          </a:p>
-        </p:txBody>
-      </p:sp>
-    </p:spTree>
-    <p:extLst>
-      <p:ext uri="{BB962C8B-B14F-4D97-AF65-F5344CB8AC3E}">
-        <p14:creationId xmlns:p14="http://schemas.microsoft.com/office/powerpoint/2010/main" val="2117452047"/>
-      </p:ext>
-    </p:extLst>
-  </p:cSld>
-  <p:clrMapOvr>
-    <a:masterClrMapping/>
-  </p:clrMapOvr>
-</p:sld>
-</file>
-
-<file path=ppt/slides/slide12.xml><?xml version="1.0" encoding="utf-8"?>
-<p:sld xmlns:a="http://schemas.openxmlformats.org/drawingml/2006/main" xmlns:r="http://schemas.openxmlformats.org/officeDocument/2006/relationships" xmlns:p="http://schemas.openxmlformats.org/presentationml/2006/main">
-  <p:cSld>
-    <p:spTree>
-      <p:nvGrpSpPr>
-        <p:cNvPr id="1" name=""/>
-        <p:cNvGrpSpPr/>
-        <p:nvPr/>
-      </p:nvGrpSpPr>
-      <p:grpSpPr>
-        <a:xfrm>
-          <a:off x="0" y="0"/>
-          <a:ext cx="0" cy="0"/>
-          <a:chOff x="0" y="0"/>
-          <a:chExt cx="0" cy="0"/>
-        </a:xfrm>
-      </p:grpSpPr>
       <p:sp>
         <p:nvSpPr>
           <p:cNvPr id="2" name="TextBox 1">
@@ -4833,7 +4434,7 @@
 </p:sld>
 </file>
 
-<file path=ppt/slides/slide13.xml><?xml version="1.0" encoding="utf-8"?>
+<file path=ppt/slides/slide12.xml><?xml version="1.0" encoding="utf-8"?>
 <p:sld xmlns:a="http://schemas.openxmlformats.org/drawingml/2006/main" xmlns:r="http://schemas.openxmlformats.org/officeDocument/2006/relationships" xmlns:p="http://schemas.openxmlformats.org/presentationml/2006/main">
   <p:cSld>
     <p:spTree>
@@ -4923,7 +4524,7 @@
 </p:sld>
 </file>
 
-<file path=ppt/slides/slide14.xml><?xml version="1.0" encoding="utf-8"?>
+<file path=ppt/slides/slide13.xml><?xml version="1.0" encoding="utf-8"?>
 <p:sld xmlns:a="http://schemas.openxmlformats.org/drawingml/2006/main" xmlns:r="http://schemas.openxmlformats.org/officeDocument/2006/relationships" xmlns:p="http://schemas.openxmlformats.org/presentationml/2006/main">
   <p:cSld>
     <p:spTree>
@@ -4945,147 +4546,6 @@
           <p:cNvPr id="2" name="TextBox 1">
             <a:extLst>
               <a:ext uri="{FF2B5EF4-FFF2-40B4-BE49-F238E27FC236}">
-                <a16:creationId xmlns:a16="http://schemas.microsoft.com/office/drawing/2014/main" id="{0776BC7B-0A5E-6C4A-9576-5611714293C2}"/>
-              </a:ext>
-            </a:extLst>
-          </p:cNvPr>
-          <p:cNvSpPr txBox="1"/>
-          <p:nvPr/>
-        </p:nvSpPr>
-        <p:spPr>
-          <a:xfrm>
-            <a:off x="560717" y="276046"/>
-            <a:ext cx="8229600" cy="1477328"/>
-          </a:xfrm>
-          <a:prstGeom prst="rect">
-            <a:avLst/>
-          </a:prstGeom>
-          <a:noFill/>
-        </p:spPr>
-        <p:txBody>
-          <a:bodyPr wrap="square" rtlCol="0">
-            <a:spAutoFit/>
-          </a:bodyPr>
-          <a:lstStyle/>
-          <a:p>
-            <a:r>
-              <a:rPr lang="en-US" b="1" dirty="0">
-                <a:solidFill>
-                  <a:srgbClr val="FF0000"/>
-                </a:solidFill>
-              </a:rPr>
-              <a:t>Something is wrong here when setting</a:t>
-            </a:r>
-          </a:p>
-          <a:p>
-            <a:r>
-              <a:rPr lang="en-US" b="1" dirty="0" err="1">
-                <a:solidFill>
-                  <a:srgbClr val="FF0000"/>
-                </a:solidFill>
-              </a:rPr>
-              <a:t>Data.diff_const</a:t>
-            </a:r>
-            <a:r>
-              <a:rPr lang="en-US" b="1" dirty="0">
-                <a:solidFill>
-                  <a:srgbClr val="FF0000"/>
-                </a:solidFill>
-              </a:rPr>
-              <a:t>  = [4.0 3.0 2.0 1.0]. </a:t>
-            </a:r>
-          </a:p>
-          <a:p>
-            <a:endParaRPr lang="en-US" b="1" dirty="0">
-              <a:solidFill>
-                <a:srgbClr val="FF0000"/>
-              </a:solidFill>
-            </a:endParaRPr>
-          </a:p>
-          <a:p>
-            <a:r>
-              <a:rPr lang="en-US" b="1" dirty="0">
-                <a:solidFill>
-                  <a:srgbClr val="FF0000"/>
-                </a:solidFill>
-              </a:rPr>
-              <a:t>The results changed: </a:t>
-            </a:r>
-          </a:p>
-          <a:p>
-            <a:r>
-              <a:rPr lang="en-US" b="1" dirty="0"/>
-              <a:t> </a:t>
-            </a:r>
-            <a:endParaRPr lang="en-US" dirty="0"/>
-          </a:p>
-        </p:txBody>
-      </p:sp>
-      <p:pic>
-        <p:nvPicPr>
-          <p:cNvPr id="5" name="Picture 4">
-            <a:extLst>
-              <a:ext uri="{FF2B5EF4-FFF2-40B4-BE49-F238E27FC236}">
-                <a16:creationId xmlns:a16="http://schemas.microsoft.com/office/drawing/2014/main" id="{C85B513B-A7EE-7C4F-9810-BE9BB287AF53}"/>
-              </a:ext>
-            </a:extLst>
-          </p:cNvPr>
-          <p:cNvPicPr>
-            <a:picLocks noChangeAspect="1"/>
-          </p:cNvPicPr>
-          <p:nvPr/>
-        </p:nvPicPr>
-        <p:blipFill>
-          <a:blip r:embed="rId2"/>
-          <a:stretch>
-            <a:fillRect/>
-          </a:stretch>
-        </p:blipFill>
-        <p:spPr>
-          <a:xfrm>
-            <a:off x="664441" y="1599705"/>
-            <a:ext cx="7150100" cy="2209800"/>
-          </a:xfrm>
-          <a:prstGeom prst="rect">
-            <a:avLst/>
-          </a:prstGeom>
-        </p:spPr>
-      </p:pic>
-    </p:spTree>
-    <p:extLst>
-      <p:ext uri="{BB962C8B-B14F-4D97-AF65-F5344CB8AC3E}">
-        <p14:creationId xmlns:p14="http://schemas.microsoft.com/office/powerpoint/2010/main" val="197557485"/>
-      </p:ext>
-    </p:extLst>
-  </p:cSld>
-  <p:clrMapOvr>
-    <a:masterClrMapping/>
-  </p:clrMapOvr>
-</p:sld>
-</file>
-
-<file path=ppt/slides/slide15.xml><?xml version="1.0" encoding="utf-8"?>
-<p:sld xmlns:a="http://schemas.openxmlformats.org/drawingml/2006/main" xmlns:r="http://schemas.openxmlformats.org/officeDocument/2006/relationships" xmlns:p="http://schemas.openxmlformats.org/presentationml/2006/main">
-  <p:cSld>
-    <p:spTree>
-      <p:nvGrpSpPr>
-        <p:cNvPr id="1" name=""/>
-        <p:cNvGrpSpPr/>
-        <p:nvPr/>
-      </p:nvGrpSpPr>
-      <p:grpSpPr>
-        <a:xfrm>
-          <a:off x="0" y="0"/>
-          <a:ext cx="0" cy="0"/>
-          <a:chOff x="0" y="0"/>
-          <a:chExt cx="0" cy="0"/>
-        </a:xfrm>
-      </p:grpSpPr>
-      <p:sp>
-        <p:nvSpPr>
-          <p:cNvPr id="2" name="TextBox 1">
-            <a:extLst>
-              <a:ext uri="{FF2B5EF4-FFF2-40B4-BE49-F238E27FC236}">
                 <a16:creationId xmlns:a16="http://schemas.microsoft.com/office/drawing/2014/main" id="{BD19F6ED-5A1B-9145-A811-0D21D5A61AC7}"/>
               </a:ext>
             </a:extLst>
@@ -5157,14 +4617,11 @@
               </a:rPr>
               <a:t>test.m</a:t>
             </a:r>
-            <a:r>
-              <a:rPr lang="en-US" dirty="0">
-                <a:solidFill>
-                  <a:srgbClr val="FF0000"/>
-                </a:solidFill>
-              </a:rPr>
-              <a:t> 8/7/2019</a:t>
-            </a:r>
+            <a:endParaRPr lang="en-US" dirty="0">
+              <a:solidFill>
+                <a:srgbClr val="FF0000"/>
+              </a:solidFill>
+            </a:endParaRPr>
           </a:p>
           <a:p>
             <a:pPr marL="342900" indent="-342900">
@@ -5205,15 +4662,7 @@
                   <a:srgbClr val="FF0000"/>
                 </a:solidFill>
               </a:rPr>
-              <a:t>Mem17, h3k9me, and general </a:t>
-            </a:r>
-            <a:r>
-              <a:rPr lang="en-US">
-                <a:solidFill>
-                  <a:srgbClr val="FF0000"/>
-                </a:solidFill>
-              </a:rPr>
-              <a:t>diffusion all do not work. </a:t>
+              <a:t>Mem17, h3k9me, and general diffusion all do not work. </a:t>
             </a:r>
           </a:p>
         </p:txBody>
@@ -5835,7 +5284,7 @@
         </p:nvSpPr>
         <p:spPr>
           <a:xfrm>
-            <a:off x="158262" y="3838720"/>
+            <a:off x="158261" y="3804525"/>
             <a:ext cx="3965329" cy="646331"/>
           </a:xfrm>
           <a:prstGeom prst="rect">
@@ -5867,7 +5316,7 @@
             </a:r>
             <a:r>
               <a:rPr lang="en-US" sz="1200" dirty="0"/>
-              <a:t>’, 1, '</a:t>
+              <a:t>', 1, '</a:t>
             </a:r>
             <a:r>
               <a:rPr lang="en-US" sz="1200" dirty="0" err="1"/>
@@ -5875,7 +5324,7 @@
             </a:r>
             <a:r>
               <a:rPr lang="en-US" sz="1200" dirty="0"/>
-              <a:t>', 1, … </a:t>
+              <a:t>', 1, ...</a:t>
             </a:r>
           </a:p>
           <a:p>
@@ -6279,7 +5728,7 @@
         </p:nvSpPr>
         <p:spPr>
           <a:xfrm>
-            <a:off x="4221918" y="3429000"/>
+            <a:off x="4283278" y="3429000"/>
             <a:ext cx="4023756" cy="646331"/>
           </a:xfrm>
           <a:prstGeom prst="rect">
@@ -7113,7 +6562,7 @@
         <p:spPr>
           <a:xfrm>
             <a:off x="384907" y="117693"/>
-            <a:ext cx="8154530" cy="6740307"/>
+            <a:ext cx="8154530" cy="6186309"/>
           </a:xfrm>
           <a:prstGeom prst="rect">
             <a:avLst/>
@@ -7179,7 +6628,7 @@
             </a:r>
             <a:r>
               <a:rPr lang="en-US" sz="1200" dirty="0"/>
-              <a:t>', 1, 'gamma', 1, '</a:t>
+              <a:t>', 1, 'gamma',1, '</a:t>
             </a:r>
             <a:r>
               <a:rPr lang="en-US" sz="1200" dirty="0" err="1"/>
@@ -7192,6 +6641,85 @@
           </a:p>
           <a:p>
             <a:r>
+              <a:rPr lang="en-US" sz="1200" dirty="0"/>
+              <a:t>Function test() parameters: </a:t>
+            </a:r>
+          </a:p>
+          <a:p>
+            <a:r>
+              <a:rPr lang="en-US" sz="1200" dirty="0" err="1"/>
+              <a:t>test_case</a:t>
+            </a:r>
+            <a:r>
+              <a:rPr lang="en-US" sz="1200" dirty="0"/>
+              <a:t> = 3</a:t>
+            </a:r>
+          </a:p>
+          <a:p>
+            <a:r>
+              <a:rPr lang="en-US" sz="1200" dirty="0" err="1"/>
+              <a:t>init_u_tag</a:t>
+            </a:r>
+            <a:r>
+              <a:rPr lang="en-US" sz="1200" dirty="0"/>
+              <a:t> = 1</a:t>
+            </a:r>
+          </a:p>
+          <a:p>
+            <a:r>
+              <a:rPr lang="en-US" sz="1200" dirty="0" err="1"/>
+              <a:t>enable_normalize</a:t>
+            </a:r>
+            <a:r>
+              <a:rPr lang="en-US" sz="1200" dirty="0"/>
+              <a:t> = 1</a:t>
+            </a:r>
+          </a:p>
+          <a:p>
+            <a:r>
+              <a:rPr lang="en-US" sz="1200" dirty="0" err="1"/>
+              <a:t>enable_damp_newton</a:t>
+            </a:r>
+            <a:r>
+              <a:rPr lang="en-US" sz="1200" dirty="0"/>
+              <a:t> = 1</a:t>
+            </a:r>
+          </a:p>
+          <a:p>
+            <a:r>
+              <a:rPr lang="en-US" sz="1200" dirty="0"/>
+              <a:t>gamma = 1.00e+00</a:t>
+            </a:r>
+          </a:p>
+          <a:p>
+            <a:r>
+              <a:rPr lang="en-US" sz="1200" dirty="0" err="1"/>
+              <a:t>init_d</a:t>
+            </a:r>
+            <a:r>
+              <a:rPr lang="en-US" sz="1200" dirty="0"/>
+              <a:t> =  30.00</a:t>
+            </a:r>
+          </a:p>
+          <a:p>
+            <a:r>
+              <a:rPr lang="en-US" sz="1200" dirty="0"/>
+              <a:t>--- test(): </a:t>
+            </a:r>
+            <a:r>
+              <a:rPr lang="en-US" sz="1200" dirty="0" err="1"/>
+              <a:t>update_option</a:t>
+            </a:r>
+            <a:r>
+              <a:rPr lang="en-US" sz="1200" dirty="0"/>
+              <a:t> = 1 ---</a:t>
+            </a:r>
+          </a:p>
+          <a:p>
+            <a:endParaRPr lang="en-US" sz="1200" dirty="0"/>
+          </a:p>
+          <a:p>
+            <a:r>
               <a:rPr lang="en-US" sz="1200" dirty="0" err="1"/>
               <a:t>Obj</a:t>
             </a:r>
@@ -7211,73 +6739,64 @@
           <a:p>
             <a:r>
               <a:rPr lang="en-US" sz="1200" dirty="0"/>
-              <a:t>   0.087 	   66.35781 	 0.00e+00 	 2.80e+01 	 13.1322            0       3.9469 </a:t>
-            </a:r>
-          </a:p>
-          <a:p>
-            <a:r>
-              <a:rPr lang="en-US" sz="1200" dirty="0"/>
-              <a:t>   0.043 	   14.14141 	 1.00e+00 	 6.55e+00 	 12.5678      4.93051       4.0643 </a:t>
-            </a:r>
-          </a:p>
-          <a:p>
-            <a:r>
-              <a:rPr lang="en-US" sz="1200" dirty="0"/>
-              <a:t>   0.042 	   13.21211 	 6.60e-02 	 6.27e+00 	 12.1197      6.55575      3.82267 </a:t>
-            </a:r>
-          </a:p>
-          <a:p>
-            <a:r>
-              <a:rPr lang="en-US" sz="1200" dirty="0"/>
-              <a:t>   0.039 	   12.26461 	 7.04e-02 	 5.99e+00 	 6.4001      5.4447     0.61298 </a:t>
-            </a:r>
-          </a:p>
-          <a:p>
-            <a:r>
-              <a:rPr lang="en-US" sz="1200" dirty="0"/>
-              <a:t>   0.009 	    2.30990 	 1.00e+00 	 3.75e+00 	 5.70635      10.0593      1.49386 </a:t>
-            </a:r>
-          </a:p>
-          <a:p>
-            <a:r>
-              <a:rPr lang="en-US" sz="1200" dirty="0"/>
-              <a:t>  -0.007 	    0.73785 	 1.00e+00 	 4.23e+00 	 5.7089      9.9985      1.4848 </a:t>
-            </a:r>
-          </a:p>
-          <a:p>
-            <a:r>
-              <a:rPr lang="en-US" sz="1200" dirty="0"/>
-              <a:t>  -0.007 	    0.73693 	 1.35e-03 	 4.24e+00 	 5.7115      9.9367      1.4756 </a:t>
-            </a:r>
-          </a:p>
-          <a:p>
-            <a:r>
-              <a:rPr lang="en-US" sz="1200" dirty="0"/>
-              <a:t>  -0.007 	    0.73602 	 1.36e-03 	 4.25e+00 	 5.7142      9.8737      1.4663 </a:t>
-            </a:r>
-          </a:p>
-          <a:p>
-            <a:r>
-              <a:rPr lang="en-US" sz="1200" dirty="0"/>
-              <a:t>  -0.007 	    0.73512 	 1.36e-03 	 4.25e+00 	 5.7169      9.8093      1.4567 </a:t>
-            </a:r>
-          </a:p>
-          <a:p>
-            <a:r>
-              <a:rPr lang="en-US" sz="1200" dirty="0"/>
-              <a:t>  -0.007 	    0.73422 	 1.36e-03 	 4.26e+00 	 5.7197      9.7434      1.4469 </a:t>
-            </a:r>
-          </a:p>
-          <a:p>
-            <a:r>
-              <a:rPr lang="en-US" sz="1200" dirty="0"/>
-              <a:t>Number of newton steps: 10 </a:t>
+              <a:t>8.706e-02 	  6.636e+01 	 0.00e+00 	 2.80e+01 	 13.1276      23.1206       5.0261 </a:t>
+            </a:r>
+          </a:p>
+          <a:p>
+            <a:r>
+              <a:rPr lang="en-US" sz="1200" dirty="0"/>
+              <a:t>5.241e-02 	  1.303e+01 	 1.00e+00 	 6.51e+00 	 5.84684       66.062      2.60439 </a:t>
+            </a:r>
+          </a:p>
+          <a:p>
+            <a:r>
+              <a:rPr lang="en-US" sz="1200" dirty="0"/>
+              <a:t>2.934e-02 	  3.223e+00 	 1.00e+00 	 2.80e+00 	 5.23573      42.0027       4.2913 </a:t>
+            </a:r>
+          </a:p>
+          <a:p>
+            <a:r>
+              <a:rPr lang="en-US" sz="1200" dirty="0"/>
+              <a:t>8.205e-03 	  1.238e+00 	 1.00e+00 	 1.36e+00 	 5.27793      44.0763      4.92953 </a:t>
+            </a:r>
+          </a:p>
+          <a:p>
+            <a:r>
+              <a:rPr lang="en-US" sz="1200" dirty="0"/>
+              <a:t>9.777e-03 	  8.895e-02 	 1.00e+00 	 1.60e+00 	 5.27559      43.2328       5.0394 </a:t>
+            </a:r>
+          </a:p>
+          <a:p>
+            <a:r>
+              <a:rPr lang="en-US" sz="1200" dirty="0"/>
+              <a:t>9.832e-03 	  1.791e-03 	 1.00e+00 	 1.63e+00 	 5.27522      43.2846      5.04322 </a:t>
+            </a:r>
+          </a:p>
+          <a:p>
+            <a:r>
+              <a:rPr lang="en-US" sz="1200" dirty="0"/>
+              <a:t>9.840e-03 	  4.625e-06 	 1.00e+00 	 1.63e+00 	 5.27523      43.2818       5.0432 </a:t>
+            </a:r>
+          </a:p>
+          <a:p>
+            <a:r>
+              <a:rPr lang="en-US" sz="1200" dirty="0"/>
+              <a:t>Number of newton steps: 7 </a:t>
             </a:r>
           </a:p>
           <a:p>
             <a:r>
               <a:rPr lang="en-US" sz="1200" dirty="0"/>
               <a:t>######################## </a:t>
+            </a:r>
+          </a:p>
+          <a:p>
+            <a:endParaRPr lang="en-US" sz="1200" dirty="0"/>
+          </a:p>
+          <a:p>
+            <a:r>
+              <a:rPr lang="en-US" sz="1200" dirty="0"/>
+              <a:t>……</a:t>
             </a:r>
           </a:p>
           <a:p>
@@ -7304,43 +6823,19 @@
           <a:p>
             <a:r>
               <a:rPr lang="en-US" sz="1200" dirty="0"/>
-              <a:t>   0.087 	    8.92968 	 0.00e+00 	 2.80e+01 	 5.67067      15.9884      1.67094 </a:t>
-            </a:r>
-          </a:p>
-          <a:p>
-            <a:r>
-              <a:rPr lang="en-US" sz="1200" dirty="0"/>
-              <a:t>   0.070 	    8.08045 	 1.01e-01 	 2.52e+01 	 5.61724      23.3071      1.92828 </a:t>
-            </a:r>
-          </a:p>
-          <a:p>
-            <a:r>
-              <a:rPr lang="en-US" sz="1200" dirty="0"/>
-              <a:t>   0.055 	    7.23462 	 1.10e-01 	 2.24e+01 	 5.15591      89.4784      4.21064 </a:t>
-            </a:r>
-          </a:p>
-          <a:p>
-            <a:r>
-              <a:rPr lang="en-US" sz="1200" dirty="0"/>
-              <a:t>  -0.000 	    2.83729 	 1.00e+00 	 7.62e-01 	 5.004983      100.4428      4.932074 </a:t>
-            </a:r>
-          </a:p>
-          <a:p>
-            <a:r>
-              <a:rPr lang="en-US" sz="1200" dirty="0"/>
-              <a:t>  -0.000 	    0.32205 	 1.00e+00 	 6.33e-02 	 5.00012      99.8469       5.0002 </a:t>
-            </a:r>
-          </a:p>
-          <a:p>
-            <a:r>
-              <a:rPr lang="en-US" sz="1200" dirty="0"/>
-              <a:t>  -0.000 	    0.00152 	 1.00e+00 	 2.45e-03 	 5.00005      99.8192      5.00156 </a:t>
-            </a:r>
-          </a:p>
-          <a:p>
-            <a:r>
-              <a:rPr lang="en-US" sz="1200" dirty="0"/>
-              <a:t>Number of newton steps: 6 </a:t>
+              <a:t>8.706e-02 	  4.527e+00 	 0.00e+00 	 2.80e+01 	 5.00001      99.9836      5.00012 </a:t>
+            </a:r>
+          </a:p>
+          <a:p>
+            <a:r>
+              <a:rPr lang="en-US" sz="1200" dirty="0"/>
+              <a:t>-7.285e-07 	  3.191e-03 	 1.00e+00 	 3.40e-04 	 5          100            5 </a:t>
+            </a:r>
+          </a:p>
+          <a:p>
+            <a:r>
+              <a:rPr lang="en-US" sz="1200" dirty="0"/>
+              <a:t>Number of newton steps: 2 </a:t>
             </a:r>
           </a:p>
           <a:p>
@@ -7354,59 +6849,8 @@
           </a:p>
           <a:p>
             <a:r>
-              <a:rPr lang="en-US" sz="1200" dirty="0" err="1"/>
-              <a:t>Obj</a:t>
-            </a:r>
-            <a:r>
-              <a:rPr lang="en-US" sz="1200" dirty="0"/>
-              <a:t> </a:t>
-            </a:r>
-            <a:r>
-              <a:rPr lang="en-US" sz="1200" dirty="0" err="1"/>
-              <a:t>Func</a:t>
-            </a:r>
-            <a:r>
-              <a:rPr lang="en-US" sz="1200" dirty="0"/>
-              <a:t> 	 Norm J 	 Damping 	 Residual 	 Diffusion Coefficients</a:t>
-            </a:r>
-          </a:p>
-          <a:p>
-            <a:r>
-              <a:rPr lang="en-US" sz="1200" dirty="0"/>
-              <a:t>   0.087 	    4.52669 	 0.00e+00 	 2.80e+01 	 5.00001      99.9646      5.00025 </a:t>
-            </a:r>
-          </a:p>
-          <a:p>
-            <a:r>
-              <a:rPr lang="en-US" sz="1200" dirty="0"/>
-              <a:t>  -0.000 	    0.00690 	 1.00e+00 	 7.40e-04 	 5          100            5 </a:t>
-            </a:r>
-          </a:p>
-          <a:p>
-            <a:r>
-              <a:rPr lang="en-US" sz="1200" dirty="0"/>
-              <a:t>   0.000 	    0.00000 	 1.00e+00 	 5.65e-07 	 5          100            5 </a:t>
-            </a:r>
-          </a:p>
-          <a:p>
-            <a:r>
-              <a:rPr lang="en-US" sz="1200" dirty="0"/>
-              <a:t>Number of newton steps: 3 </a:t>
-            </a:r>
-          </a:p>
-          <a:p>
-            <a:r>
-              <a:rPr lang="en-US" sz="1200" dirty="0"/>
-              <a:t>######################## </a:t>
-            </a:r>
-          </a:p>
-          <a:p>
-            <a:endParaRPr lang="en-US" sz="1200" dirty="0"/>
-          </a:p>
-          <a:p>
-            <a:r>
-              <a:rPr lang="en-US" sz="1200" dirty="0"/>
-              <a:t>Elapsed time is 6.777432 seconds.</a:t>
+              <a:rPr lang="en-US" sz="1200" dirty="0"/>
+              <a:t>Elapsed time is 3.862001 seconds.</a:t>
             </a:r>
           </a:p>
         </p:txBody>
@@ -7522,7 +6966,7 @@
             </a:r>
             <a:r>
               <a:rPr lang="en-US" dirty="0"/>
-              <a:t> = 4, also converged with 2 outer iterations with normalization and damping. </a:t>
+              <a:t> = 4, gamma = 1.0e-5 also converged with 2 outer iterations with normalization and damping. </a:t>
             </a:r>
           </a:p>
         </p:txBody>

</xml_diff>

<commit_message>
Mem17 converged, H3K9 case converged to very small diffusion coefficients.
</commit_message>
<xml_diff>
--- a/doc/result_0404_2019.pptx
+++ b/doc/result_0404_2019.pptx
@@ -5,7 +5,7 @@
     <p:sldMasterId id="2147483660" r:id="rId1"/>
   </p:sldMasterIdLst>
   <p:notesMasterIdLst>
-    <p:notesMasterId r:id="rId15"/>
+    <p:notesMasterId r:id="rId16"/>
   </p:notesMasterIdLst>
   <p:sldIdLst>
     <p:sldId id="256" r:id="rId2"/>
@@ -18,9 +18,10 @@
     <p:sldId id="266" r:id="rId9"/>
     <p:sldId id="265" r:id="rId10"/>
     <p:sldId id="276" r:id="rId11"/>
-    <p:sldId id="272" r:id="rId12"/>
-    <p:sldId id="273" r:id="rId13"/>
-    <p:sldId id="275" r:id="rId14"/>
+    <p:sldId id="277" r:id="rId12"/>
+    <p:sldId id="272" r:id="rId13"/>
+    <p:sldId id="273" r:id="rId14"/>
+    <p:sldId id="275" r:id="rId15"/>
   </p:sldIdLst>
   <p:sldSz cx="9144000" cy="6858000" type="letter"/>
   <p:notesSz cx="6858000" cy="9144000"/>
@@ -4283,6 +4284,342 @@
           <p:cNvPr id="2" name="TextBox 1">
             <a:extLst>
               <a:ext uri="{FF2B5EF4-FFF2-40B4-BE49-F238E27FC236}">
+                <a16:creationId xmlns:a16="http://schemas.microsoft.com/office/drawing/2014/main" id="{610C8002-1235-3749-B811-156523F3C531}"/>
+              </a:ext>
+            </a:extLst>
+          </p:cNvPr>
+          <p:cNvSpPr txBox="1"/>
+          <p:nvPr/>
+        </p:nvSpPr>
+        <p:spPr>
+          <a:xfrm>
+            <a:off x="520700" y="115044"/>
+            <a:ext cx="7493000" cy="6401753"/>
+          </a:xfrm>
+          <a:prstGeom prst="rect">
+            <a:avLst/>
+          </a:prstGeom>
+          <a:noFill/>
+        </p:spPr>
+        <p:txBody>
+          <a:bodyPr wrap="square" rtlCol="0">
+            <a:spAutoFit/>
+          </a:bodyPr>
+          <a:lstStyle/>
+          <a:p>
+            <a:r>
+              <a:rPr lang="en-US" b="1" dirty="0"/>
+              <a:t>H3K9me converged to very small diffusion coefficients. </a:t>
+            </a:r>
+            <a:endParaRPr lang="en-US" dirty="0"/>
+          </a:p>
+          <a:p>
+            <a:r>
+              <a:rPr lang="en-US" sz="1400" dirty="0"/>
+              <a:t>&gt;&gt; test('</a:t>
+            </a:r>
+            <a:r>
+              <a:rPr lang="en-US" sz="1400" dirty="0" err="1"/>
+              <a:t>test_case</a:t>
+            </a:r>
+            <a:r>
+              <a:rPr lang="en-US" sz="1400" dirty="0"/>
+              <a:t>', 6, '</a:t>
+            </a:r>
+            <a:r>
+              <a:rPr lang="en-US" sz="1400" dirty="0" err="1"/>
+              <a:t>init_u_tag</a:t>
+            </a:r>
+            <a:r>
+              <a:rPr lang="en-US" sz="1400" dirty="0"/>
+              <a:t>', 2, '</a:t>
+            </a:r>
+            <a:r>
+              <a:rPr lang="en-US" sz="1400" dirty="0" err="1"/>
+              <a:t>enable_normalize</a:t>
+            </a:r>
+            <a:r>
+              <a:rPr lang="en-US" sz="1400" dirty="0"/>
+              <a:t>', 1, '</a:t>
+            </a:r>
+            <a:r>
+              <a:rPr lang="en-US" sz="1400" dirty="0" err="1"/>
+              <a:t>enable_damp_newton</a:t>
+            </a:r>
+            <a:r>
+              <a:rPr lang="en-US" sz="1400" dirty="0"/>
+              <a:t>', 1, '</a:t>
+            </a:r>
+            <a:r>
+              <a:rPr lang="en-US" sz="1400" dirty="0" err="1"/>
+              <a:t>init_d</a:t>
+            </a:r>
+            <a:r>
+              <a:rPr lang="en-US" sz="1400" dirty="0"/>
+              <a:t>', 10, 'gamma', 1.0);</a:t>
+            </a:r>
+          </a:p>
+          <a:p>
+            <a:r>
+              <a:rPr lang="en-US" sz="1400" dirty="0"/>
+              <a:t>Function test() parameters: </a:t>
+            </a:r>
+          </a:p>
+          <a:p>
+            <a:r>
+              <a:rPr lang="en-US" sz="1400" dirty="0" err="1"/>
+              <a:t>test_case</a:t>
+            </a:r>
+            <a:r>
+              <a:rPr lang="en-US" sz="1400" dirty="0"/>
+              <a:t> = 6</a:t>
+            </a:r>
+          </a:p>
+          <a:p>
+            <a:r>
+              <a:rPr lang="en-US" sz="1400" dirty="0" err="1"/>
+              <a:t>init_u_tag</a:t>
+            </a:r>
+            <a:r>
+              <a:rPr lang="en-US" sz="1400" dirty="0"/>
+              <a:t> = 2</a:t>
+            </a:r>
+          </a:p>
+          <a:p>
+            <a:r>
+              <a:rPr lang="en-US" sz="1400" dirty="0" err="1"/>
+              <a:t>enable_normalize</a:t>
+            </a:r>
+            <a:r>
+              <a:rPr lang="en-US" sz="1400" dirty="0"/>
+              <a:t> = 1</a:t>
+            </a:r>
+          </a:p>
+          <a:p>
+            <a:r>
+              <a:rPr lang="en-US" sz="1400" dirty="0" err="1"/>
+              <a:t>enable_damp_newton</a:t>
+            </a:r>
+            <a:r>
+              <a:rPr lang="en-US" sz="1400" dirty="0"/>
+              <a:t> = 1</a:t>
+            </a:r>
+          </a:p>
+          <a:p>
+            <a:r>
+              <a:rPr lang="en-US" sz="1400" dirty="0"/>
+              <a:t>gamma = 1.00e+00</a:t>
+            </a:r>
+          </a:p>
+          <a:p>
+            <a:r>
+              <a:rPr lang="en-US" sz="1400" dirty="0" err="1"/>
+              <a:t>init_d</a:t>
+            </a:r>
+            <a:r>
+              <a:rPr lang="en-US" sz="1400" dirty="0"/>
+              <a:t> =  10.00</a:t>
+            </a:r>
+          </a:p>
+          <a:p>
+            <a:r>
+              <a:rPr lang="en-US" sz="1400" dirty="0"/>
+              <a:t>Function test(): Set </a:t>
+            </a:r>
+            <a:r>
+              <a:rPr lang="en-US" sz="1400" dirty="0" err="1"/>
+              <a:t>update_option</a:t>
+            </a:r>
+            <a:r>
+              <a:rPr lang="en-US" sz="1400" dirty="0"/>
+              <a:t> = 2 ---</a:t>
+            </a:r>
+          </a:p>
+          <a:p>
+            <a:r>
+              <a:rPr lang="en-US" sz="1400" dirty="0"/>
+              <a:t>Function test(): Set magnification = 99 ---</a:t>
+            </a:r>
+          </a:p>
+          <a:p>
+            <a:r>
+              <a:rPr lang="en-US" sz="1400" dirty="0" err="1"/>
+              <a:t>Obj</a:t>
+            </a:r>
+            <a:r>
+              <a:rPr lang="en-US" sz="1400" dirty="0"/>
+              <a:t> </a:t>
+            </a:r>
+            <a:r>
+              <a:rPr lang="en-US" sz="1400" dirty="0" err="1"/>
+              <a:t>Func</a:t>
+            </a:r>
+            <a:r>
+              <a:rPr lang="en-US" sz="1400" dirty="0"/>
+              <a:t> 	 Norm J 	 Damping 	 Residual 	 Diffusion Coefficients</a:t>
+            </a:r>
+          </a:p>
+          <a:p>
+            <a:r>
+              <a:rPr lang="en-US" sz="1400" dirty="0"/>
+              <a:t>0.000e+00 	  3.100e+04 	 0.00e+00 	 0.00e+00 	 0.0057696    0.015168 </a:t>
+            </a:r>
+          </a:p>
+          <a:p>
+            <a:r>
+              <a:rPr lang="en-US" sz="1400" dirty="0"/>
+              <a:t>-1.565e+01 	  4.324e+01 	 1.00e+00 	 1.06e+01 	 0  0 </a:t>
+            </a:r>
+          </a:p>
+          <a:p>
+            <a:r>
+              <a:rPr lang="en-US" sz="1400" dirty="0"/>
+              <a:t>-2.375e+01 	  6.373e-02 	 1.00e+00 	 2.97e+01 	 0  8.4781e-08 </a:t>
+            </a:r>
+          </a:p>
+          <a:p>
+            <a:r>
+              <a:rPr lang="en-US" sz="1400" dirty="0"/>
+              <a:t>-2.382e+01 	  5.118e-02 	 1.36e-01 	 2.97e+01 	 0  9.5158e-08 </a:t>
+            </a:r>
+          </a:p>
+          <a:p>
+            <a:r>
+              <a:rPr lang="en-US" sz="1400" dirty="0"/>
+              <a:t>-2.383e+01 	  5.028e-02 	 1.92e-02 	 2.97e+01 	 0  1.0552e-07 </a:t>
+            </a:r>
+          </a:p>
+          <a:p>
+            <a:r>
+              <a:rPr lang="en-US" sz="1400" dirty="0"/>
+              <a:t>-2.384e+01 	  4.936e-02 	 1.95e-02 	 2.97e+01 	 0  1.1586e-07 </a:t>
+            </a:r>
+          </a:p>
+          <a:p>
+            <a:r>
+              <a:rPr lang="en-US" sz="1400" dirty="0"/>
+              <a:t>……</a:t>
+            </a:r>
+          </a:p>
+          <a:p>
+            <a:r>
+              <a:rPr lang="en-US" sz="1400" dirty="0"/>
+              <a:t>Number of newton steps: 10 </a:t>
+            </a:r>
+          </a:p>
+          <a:p>
+            <a:r>
+              <a:rPr lang="en-US" sz="1400" dirty="0"/>
+              <a:t>######################## </a:t>
+            </a:r>
+          </a:p>
+          <a:p>
+            <a:r>
+              <a:rPr lang="en-US" sz="1400" dirty="0"/>
+              <a:t>……</a:t>
+            </a:r>
+          </a:p>
+          <a:p>
+            <a:r>
+              <a:rPr lang="en-US" sz="1400" dirty="0" err="1"/>
+              <a:t>Obj</a:t>
+            </a:r>
+            <a:r>
+              <a:rPr lang="en-US" sz="1400" dirty="0"/>
+              <a:t> </a:t>
+            </a:r>
+            <a:r>
+              <a:rPr lang="en-US" sz="1400" dirty="0" err="1"/>
+              <a:t>Func</a:t>
+            </a:r>
+            <a:r>
+              <a:rPr lang="en-US" sz="1400" dirty="0"/>
+              <a:t> 	 Norm J 	 Damping 	 Residual 	 Diffusion Coefficients</a:t>
+            </a:r>
+          </a:p>
+          <a:p>
+            <a:r>
+              <a:rPr lang="en-US" sz="1400" dirty="0"/>
+              <a:t>Function </a:t>
+            </a:r>
+            <a:r>
+              <a:rPr lang="en-US" sz="1400" dirty="0" err="1"/>
+              <a:t>compute_objective</a:t>
+            </a:r>
+            <a:r>
+              <a:rPr lang="en-US" sz="1400" dirty="0"/>
+              <a:t>(): abs(</a:t>
+            </a:r>
+            <a:r>
+              <a:rPr lang="en-US" sz="1400" dirty="0" err="1"/>
+              <a:t>dd</a:t>
+            </a:r>
+            <a:r>
+              <a:rPr lang="en-US" sz="1400" dirty="0"/>
+              <a:t>)&lt;=eps, do not normalize ---</a:t>
+            </a:r>
+          </a:p>
+          <a:p>
+            <a:r>
+              <a:rPr lang="en-US" sz="1400" dirty="0"/>
+              <a:t>-2.428e+01 	  1.075e-02 	 0.00e+00 	 3.01e+01 	 0  6.2966e-07 </a:t>
+            </a:r>
+          </a:p>
+          <a:p>
+            <a:r>
+              <a:rPr lang="en-US" sz="1400" dirty="0"/>
+              <a:t>Number of newton steps: 1 </a:t>
+            </a:r>
+          </a:p>
+          <a:p>
+            <a:r>
+              <a:rPr lang="en-US" sz="1400" dirty="0"/>
+              <a:t>######################## </a:t>
+            </a:r>
+          </a:p>
+          <a:p>
+            <a:r>
+              <a:rPr lang="en-US" sz="1400" dirty="0"/>
+              <a:t>Elapsed time is 11.216736 seconds.</a:t>
+            </a:r>
+          </a:p>
+        </p:txBody>
+      </p:sp>
+    </p:spTree>
+    <p:extLst>
+      <p:ext uri="{BB962C8B-B14F-4D97-AF65-F5344CB8AC3E}">
+        <p14:creationId xmlns:p14="http://schemas.microsoft.com/office/powerpoint/2010/main" val="4115839406"/>
+      </p:ext>
+    </p:extLst>
+  </p:cSld>
+  <p:clrMapOvr>
+    <a:masterClrMapping/>
+  </p:clrMapOvr>
+</p:sld>
+</file>
+
+<file path=ppt/slides/slide12.xml><?xml version="1.0" encoding="utf-8"?>
+<p:sld xmlns:a="http://schemas.openxmlformats.org/drawingml/2006/main" xmlns:r="http://schemas.openxmlformats.org/officeDocument/2006/relationships" xmlns:p="http://schemas.openxmlformats.org/presentationml/2006/main">
+  <p:cSld>
+    <p:spTree>
+      <p:nvGrpSpPr>
+        <p:cNvPr id="1" name=""/>
+        <p:cNvGrpSpPr/>
+        <p:nvPr/>
+      </p:nvGrpSpPr>
+      <p:grpSpPr>
+        <a:xfrm>
+          <a:off x="0" y="0"/>
+          <a:ext cx="0" cy="0"/>
+          <a:chOff x="0" y="0"/>
+          <a:chExt cx="0" cy="0"/>
+        </a:xfrm>
+      </p:grpSpPr>
+      <p:sp>
+        <p:nvSpPr>
+          <p:cNvPr id="2" name="TextBox 1">
+            <a:extLst>
+              <a:ext uri="{FF2B5EF4-FFF2-40B4-BE49-F238E27FC236}">
                 <a16:creationId xmlns:a16="http://schemas.microsoft.com/office/drawing/2014/main" id="{26A68757-28D3-E54B-826A-73D56E725A5C}"/>
               </a:ext>
             </a:extLst>
@@ -4434,7 +4771,7 @@
 </p:sld>
 </file>
 
-<file path=ppt/slides/slide12.xml><?xml version="1.0" encoding="utf-8"?>
+<file path=ppt/slides/slide13.xml><?xml version="1.0" encoding="utf-8"?>
 <p:sld xmlns:a="http://schemas.openxmlformats.org/drawingml/2006/main" xmlns:r="http://schemas.openxmlformats.org/officeDocument/2006/relationships" xmlns:p="http://schemas.openxmlformats.org/presentationml/2006/main">
   <p:cSld>
     <p:spTree>
@@ -4524,7 +4861,7 @@
 </p:sld>
 </file>
 
-<file path=ppt/slides/slide13.xml><?xml version="1.0" encoding="utf-8"?>
+<file path=ppt/slides/slide14.xml><?xml version="1.0" encoding="utf-8"?>
 <p:sld xmlns:a="http://schemas.openxmlformats.org/drawingml/2006/main" xmlns:r="http://schemas.openxmlformats.org/officeDocument/2006/relationships" xmlns:p="http://schemas.openxmlformats.org/presentationml/2006/main">
   <p:cSld>
     <p:spTree>

</xml_diff>

<commit_message>
Moved src/utility.m to fluocell/src/utility/.
</commit_message>
<xml_diff>
--- a/doc/result_0404_2019.pptx
+++ b/doc/result_0404_2019.pptx
@@ -835,6 +835,90 @@
     <p:extLst>
       <p:ext uri="{BB962C8B-B14F-4D97-AF65-F5344CB8AC3E}">
         <p14:creationId xmlns:p14="http://schemas.microsoft.com/office/powerpoint/2010/main" val="3079157939"/>
+      </p:ext>
+    </p:extLst>
+  </p:cSld>
+  <p:clrMapOvr>
+    <a:masterClrMapping/>
+  </p:clrMapOvr>
+</p:notes>
+</file>
+
+<file path=ppt/notesSlides/notesSlide5.xml><?xml version="1.0" encoding="utf-8"?>
+<p:notes xmlns:a="http://schemas.openxmlformats.org/drawingml/2006/main" xmlns:r="http://schemas.openxmlformats.org/officeDocument/2006/relationships" xmlns:p="http://schemas.openxmlformats.org/presentationml/2006/main">
+  <p:cSld>
+    <p:spTree>
+      <p:nvGrpSpPr>
+        <p:cNvPr id="1" name=""/>
+        <p:cNvGrpSpPr/>
+        <p:nvPr/>
+      </p:nvGrpSpPr>
+      <p:grpSpPr>
+        <a:xfrm>
+          <a:off x="0" y="0"/>
+          <a:ext cx="0" cy="0"/>
+          <a:chOff x="0" y="0"/>
+          <a:chExt cx="0" cy="0"/>
+        </a:xfrm>
+      </p:grpSpPr>
+      <p:sp>
+        <p:nvSpPr>
+          <p:cNvPr id="2" name="Slide Image Placeholder 1"/>
+          <p:cNvSpPr>
+            <a:spLocks noGrp="1" noRot="1" noChangeAspect="1"/>
+          </p:cNvSpPr>
+          <p:nvPr>
+            <p:ph type="sldImg"/>
+          </p:nvPr>
+        </p:nvSpPr>
+        <p:spPr/>
+      </p:sp>
+      <p:sp>
+        <p:nvSpPr>
+          <p:cNvPr id="3" name="Notes Placeholder 2"/>
+          <p:cNvSpPr>
+            <a:spLocks noGrp="1"/>
+          </p:cNvSpPr>
+          <p:nvPr>
+            <p:ph type="body" idx="1"/>
+          </p:nvPr>
+        </p:nvSpPr>
+        <p:spPr/>
+        <p:txBody>
+          <a:bodyPr/>
+          <a:lstStyle/>
+          <a:p>
+            <a:endParaRPr lang="en-US" dirty="0"/>
+          </a:p>
+        </p:txBody>
+      </p:sp>
+      <p:sp>
+        <p:nvSpPr>
+          <p:cNvPr id="4" name="Slide Number Placeholder 3"/>
+          <p:cNvSpPr>
+            <a:spLocks noGrp="1"/>
+          </p:cNvSpPr>
+          <p:nvPr>
+            <p:ph type="sldNum" sz="quarter" idx="5"/>
+          </p:nvPr>
+        </p:nvSpPr>
+        <p:spPr/>
+        <p:txBody>
+          <a:bodyPr/>
+          <a:lstStyle/>
+          <a:p>
+            <a:fld id="{AA109745-F71C-A340-8D0C-65AACD618045}" type="slidenum">
+              <a:rPr lang="en-US" smtClean="0"/>
+              <a:t>14</a:t>
+            </a:fld>
+            <a:endParaRPr lang="en-US"/>
+          </a:p>
+        </p:txBody>
+      </p:sp>
+    </p:spTree>
+    <p:extLst>
+      <p:ext uri="{BB962C8B-B14F-4D97-AF65-F5344CB8AC3E}">
+        <p14:creationId xmlns:p14="http://schemas.microsoft.com/office/powerpoint/2010/main" val="1152279803"/>
       </p:ext>
     </p:extLst>
   </p:cSld>
@@ -5000,6 +5084,81 @@
                 </a:solidFill>
               </a:rPr>
               <a:t>Mem17, h3k9me, and general diffusion all do not work. </a:t>
+            </a:r>
+          </a:p>
+        </p:txBody>
+      </p:sp>
+      <p:sp>
+        <p:nvSpPr>
+          <p:cNvPr id="3" name="TextBox 2">
+            <a:extLst>
+              <a:ext uri="{FF2B5EF4-FFF2-40B4-BE49-F238E27FC236}">
+                <a16:creationId xmlns:a16="http://schemas.microsoft.com/office/drawing/2014/main" id="{23345994-C738-F043-B242-8F8DD14B5607}"/>
+              </a:ext>
+            </a:extLst>
+          </p:cNvPr>
+          <p:cNvSpPr txBox="1"/>
+          <p:nvPr/>
+        </p:nvSpPr>
+        <p:spPr>
+          <a:xfrm>
+            <a:off x="337624" y="2447778"/>
+            <a:ext cx="8145193" cy="646331"/>
+          </a:xfrm>
+          <a:prstGeom prst="rect">
+            <a:avLst/>
+          </a:prstGeom>
+          <a:noFill/>
+        </p:spPr>
+        <p:txBody>
+          <a:bodyPr wrap="square" rtlCol="0">
+            <a:spAutoFit/>
+          </a:bodyPr>
+          <a:lstStyle/>
+          <a:p>
+            <a:r>
+              <a:rPr lang="en-US" dirty="0"/>
+              <a:t>&gt;&gt; test('</a:t>
+            </a:r>
+            <a:r>
+              <a:rPr lang="en-US" dirty="0" err="1"/>
+              <a:t>test_case</a:t>
+            </a:r>
+            <a:r>
+              <a:rPr lang="en-US" dirty="0"/>
+              <a:t>', 7, '</a:t>
+            </a:r>
+            <a:r>
+              <a:rPr lang="en-US" dirty="0" err="1"/>
+              <a:t>init_u_tag</a:t>
+            </a:r>
+            <a:r>
+              <a:rPr lang="en-US" dirty="0"/>
+              <a:t>', 2, '</a:t>
+            </a:r>
+            <a:r>
+              <a:rPr lang="en-US" dirty="0" err="1"/>
+              <a:t>enable_normalize</a:t>
+            </a:r>
+            <a:r>
+              <a:rPr lang="en-US" dirty="0"/>
+              <a:t>', 1, '</a:t>
+            </a:r>
+            <a:r>
+              <a:rPr lang="en-US" dirty="0" err="1"/>
+              <a:t>enable_damp_newton</a:t>
+            </a:r>
+            <a:r>
+              <a:rPr lang="en-US" dirty="0"/>
+              <a:t>', 1, '</a:t>
+            </a:r>
+            <a:r>
+              <a:rPr lang="en-US" dirty="0" err="1"/>
+              <a:t>init_d</a:t>
+            </a:r>
+            <a:r>
+              <a:rPr lang="en-US" dirty="0"/>
+              <a:t>', 10, 'gamma', 1.0);</a:t>
             </a:r>
           </a:p>
         </p:txBody>

</xml_diff>

<commit_message>
In opt_init_data.m, addded load_data() and normalize_data() functions. Also added the codes to visualize the diffusion map.
</commit_message>
<xml_diff>
--- a/doc/result_0404_2019.pptx
+++ b/doc/result_0404_2019.pptx
@@ -5163,6 +5163,71 @@
           </a:p>
         </p:txBody>
       </p:sp>
+      <p:pic>
+        <p:nvPicPr>
+          <p:cNvPr id="5" name="Picture 4">
+            <a:extLst>
+              <a:ext uri="{FF2B5EF4-FFF2-40B4-BE49-F238E27FC236}">
+                <a16:creationId xmlns:a16="http://schemas.microsoft.com/office/drawing/2014/main" id="{5D2AF390-4C2E-C447-B980-2128B0208120}"/>
+              </a:ext>
+            </a:extLst>
+          </p:cNvPr>
+          <p:cNvPicPr>
+            <a:picLocks noChangeAspect="1"/>
+          </p:cNvPicPr>
+          <p:nvPr/>
+        </p:nvPicPr>
+        <p:blipFill>
+          <a:blip r:embed="rId3"/>
+          <a:stretch>
+            <a:fillRect/>
+          </a:stretch>
+        </p:blipFill>
+        <p:spPr>
+          <a:xfrm>
+            <a:off x="337624" y="3094109"/>
+            <a:ext cx="7231576" cy="2843436"/>
+          </a:xfrm>
+          <a:prstGeom prst="rect">
+            <a:avLst/>
+          </a:prstGeom>
+        </p:spPr>
+      </p:pic>
+      <p:sp>
+        <p:nvSpPr>
+          <p:cNvPr id="6" name="TextBox 5">
+            <a:extLst>
+              <a:ext uri="{FF2B5EF4-FFF2-40B4-BE49-F238E27FC236}">
+                <a16:creationId xmlns:a16="http://schemas.microsoft.com/office/drawing/2014/main" id="{03C16C12-E7BD-034F-B74B-2B9F208C8229}"/>
+              </a:ext>
+            </a:extLst>
+          </p:cNvPr>
+          <p:cNvSpPr txBox="1"/>
+          <p:nvPr/>
+        </p:nvSpPr>
+        <p:spPr>
+          <a:xfrm>
+            <a:off x="469900" y="6184900"/>
+            <a:ext cx="3352800" cy="369332"/>
+          </a:xfrm>
+          <a:prstGeom prst="rect">
+            <a:avLst/>
+          </a:prstGeom>
+          <a:noFill/>
+        </p:spPr>
+        <p:txBody>
+          <a:bodyPr wrap="square" rtlCol="0">
+            <a:spAutoFit/>
+          </a:bodyPr>
+          <a:lstStyle/>
+          <a:p>
+            <a:r>
+              <a:rPr lang="en-US"/>
+              <a:t>……</a:t>
+            </a:r>
+          </a:p>
+        </p:txBody>
+      </p:sp>
     </p:spTree>
     <p:extLst>
       <p:ext uri="{BB962C8B-B14F-4D97-AF65-F5344CB8AC3E}">
@@ -5926,36 +5991,6 @@
       </p:sp>
       <p:pic>
         <p:nvPicPr>
-          <p:cNvPr id="10" name="Picture 9">
-            <a:extLst>
-              <a:ext uri="{FF2B5EF4-FFF2-40B4-BE49-F238E27FC236}">
-                <a16:creationId xmlns:a16="http://schemas.microsoft.com/office/drawing/2014/main" id="{A8265A95-836B-BA44-91F6-5706C7205EB7}"/>
-              </a:ext>
-            </a:extLst>
-          </p:cNvPr>
-          <p:cNvPicPr>
-            <a:picLocks noChangeAspect="1"/>
-          </p:cNvPicPr>
-          <p:nvPr/>
-        </p:nvPicPr>
-        <p:blipFill>
-          <a:blip r:embed="rId2"/>
-          <a:stretch>
-            <a:fillRect/>
-          </a:stretch>
-        </p:blipFill>
-        <p:spPr>
-          <a:xfrm>
-            <a:off x="410307" y="1011667"/>
-            <a:ext cx="3147647" cy="2360735"/>
-          </a:xfrm>
-          <a:prstGeom prst="rect">
-            <a:avLst/>
-          </a:prstGeom>
-        </p:spPr>
-      </p:pic>
-      <p:pic>
-        <p:nvPicPr>
           <p:cNvPr id="11" name="Picture 10">
             <a:extLst>
               <a:ext uri="{FF2B5EF4-FFF2-40B4-BE49-F238E27FC236}">
@@ -5969,7 +6004,7 @@
           <p:nvPr/>
         </p:nvPicPr>
         <p:blipFill>
-          <a:blip r:embed="rId3"/>
+          <a:blip r:embed="rId2"/>
           <a:stretch>
             <a:fillRect/>
           </a:stretch>
@@ -5999,6 +6034,36 @@
           <p:nvPr/>
         </p:nvPicPr>
         <p:blipFill>
+          <a:blip r:embed="rId3"/>
+          <a:stretch>
+            <a:fillRect/>
+          </a:stretch>
+        </p:blipFill>
+        <p:spPr>
+          <a:xfrm>
+            <a:off x="437782" y="4450856"/>
+            <a:ext cx="3092696" cy="2319522"/>
+          </a:xfrm>
+          <a:prstGeom prst="rect">
+            <a:avLst/>
+          </a:prstGeom>
+        </p:spPr>
+      </p:pic>
+      <p:pic>
+        <p:nvPicPr>
+          <p:cNvPr id="3" name="Picture 2">
+            <a:extLst>
+              <a:ext uri="{FF2B5EF4-FFF2-40B4-BE49-F238E27FC236}">
+                <a16:creationId xmlns:a16="http://schemas.microsoft.com/office/drawing/2014/main" id="{75EB1DCC-4976-4C47-B9EE-A837E26C0B6D}"/>
+              </a:ext>
+            </a:extLst>
+          </p:cNvPr>
+          <p:cNvPicPr>
+            <a:picLocks noChangeAspect="1"/>
+          </p:cNvPicPr>
+          <p:nvPr/>
+        </p:nvPicPr>
+        <p:blipFill>
           <a:blip r:embed="rId4"/>
           <a:stretch>
             <a:fillRect/>
@@ -6006,7 +6071,7 @@
         </p:blipFill>
         <p:spPr>
           <a:xfrm>
-            <a:off x="437782" y="4450856"/>
+            <a:off x="437782" y="1003849"/>
             <a:ext cx="3092696" cy="2319522"/>
           </a:xfrm>
           <a:prstGeom prst="rect">
@@ -6389,10 +6454,10 @@
       </p:pic>
       <p:pic>
         <p:nvPicPr>
-          <p:cNvPr id="17" name="Picture 16">
+          <p:cNvPr id="2" name="Picture 1">
             <a:extLst>
               <a:ext uri="{FF2B5EF4-FFF2-40B4-BE49-F238E27FC236}">
-                <a16:creationId xmlns:a16="http://schemas.microsoft.com/office/drawing/2014/main" id="{BED0ECD2-6914-AF49-BA71-45E8F8D6884D}"/>
+                <a16:creationId xmlns:a16="http://schemas.microsoft.com/office/drawing/2014/main" id="{5FAB36F3-1949-5441-A097-5106F99214B3}"/>
               </a:ext>
             </a:extLst>
           </p:cNvPr>
@@ -6409,8 +6474,8 @@
         </p:blipFill>
         <p:spPr>
           <a:xfrm>
-            <a:off x="4572000" y="4183916"/>
-            <a:ext cx="3446313" cy="2584735"/>
+            <a:off x="4572000" y="4157596"/>
+            <a:ext cx="3446315" cy="2584736"/>
           </a:xfrm>
           <a:prstGeom prst="rect">
             <a:avLst/>
@@ -7499,10 +7564,10 @@
       </p:pic>
       <p:pic>
         <p:nvPicPr>
-          <p:cNvPr id="5" name="Picture 4">
+          <p:cNvPr id="3" name="Picture 2">
             <a:extLst>
               <a:ext uri="{FF2B5EF4-FFF2-40B4-BE49-F238E27FC236}">
-                <a16:creationId xmlns:a16="http://schemas.microsoft.com/office/drawing/2014/main" id="{CC3274C8-1AF5-9C46-962A-C6A8C02AE260}"/>
+                <a16:creationId xmlns:a16="http://schemas.microsoft.com/office/drawing/2014/main" id="{206CEE5C-A3EF-EE44-985F-03A4C8DF84BF}"/>
               </a:ext>
             </a:extLst>
           </p:cNvPr>
@@ -7519,8 +7584,8 @@
         </p:blipFill>
         <p:spPr>
           <a:xfrm>
-            <a:off x="1046285" y="3997203"/>
-            <a:ext cx="6075484" cy="2354883"/>
+            <a:off x="918672" y="4116814"/>
+            <a:ext cx="5943600" cy="2302671"/>
           </a:xfrm>
           <a:prstGeom prst="rect">
             <a:avLst/>

</xml_diff>

<commit_message>
All the general testing cases are working now.
</commit_message>
<xml_diff>
--- a/doc/result_0404_2019.pptx
+++ b/doc/result_0404_2019.pptx
@@ -5,7 +5,7 @@
     <p:sldMasterId id="2147483660" r:id="rId1"/>
   </p:sldMasterIdLst>
   <p:notesMasterIdLst>
-    <p:notesMasterId r:id="rId16"/>
+    <p:notesMasterId r:id="rId18"/>
   </p:notesMasterIdLst>
   <p:sldIdLst>
     <p:sldId id="256" r:id="rId2"/>
@@ -22,6 +22,8 @@
     <p:sldId id="272" r:id="rId13"/>
     <p:sldId id="273" r:id="rId14"/>
     <p:sldId id="275" r:id="rId15"/>
+    <p:sldId id="278" r:id="rId16"/>
+    <p:sldId id="279" r:id="rId17"/>
   </p:sldIdLst>
   <p:sldSz cx="9144000" cy="6858000" type="letter"/>
   <p:notesSz cx="6858000" cy="9144000"/>
@@ -5177,6 +5179,448 @@
     <p:extLst>
       <p:ext uri="{BB962C8B-B14F-4D97-AF65-F5344CB8AC3E}">
         <p14:creationId xmlns:p14="http://schemas.microsoft.com/office/powerpoint/2010/main" val="1227568197"/>
+      </p:ext>
+    </p:extLst>
+  </p:cSld>
+  <p:clrMapOvr>
+    <a:masterClrMapping/>
+  </p:clrMapOvr>
+</p:sld>
+</file>
+
+<file path=ppt/slides/slide15.xml><?xml version="1.0" encoding="utf-8"?>
+<p:sld xmlns:a="http://schemas.openxmlformats.org/drawingml/2006/main" xmlns:r="http://schemas.openxmlformats.org/officeDocument/2006/relationships" xmlns:p="http://schemas.openxmlformats.org/presentationml/2006/main">
+  <p:cSld>
+    <p:spTree>
+      <p:nvGrpSpPr>
+        <p:cNvPr id="1" name=""/>
+        <p:cNvGrpSpPr/>
+        <p:nvPr/>
+      </p:nvGrpSpPr>
+      <p:grpSpPr>
+        <a:xfrm>
+          <a:off x="0" y="0"/>
+          <a:ext cx="0" cy="0"/>
+          <a:chOff x="0" y="0"/>
+          <a:chExt cx="0" cy="0"/>
+        </a:xfrm>
+      </p:grpSpPr>
+      <p:sp>
+        <p:nvSpPr>
+          <p:cNvPr id="2" name="TextBox 1">
+            <a:extLst>
+              <a:ext uri="{FF2B5EF4-FFF2-40B4-BE49-F238E27FC236}">
+                <a16:creationId xmlns:a16="http://schemas.microsoft.com/office/drawing/2014/main" id="{25F0815D-E644-5642-8727-F848A86EEBA2}"/>
+              </a:ext>
+            </a:extLst>
+          </p:cNvPr>
+          <p:cNvSpPr txBox="1"/>
+          <p:nvPr/>
+        </p:nvSpPr>
+        <p:spPr>
+          <a:xfrm>
+            <a:off x="340242" y="308344"/>
+            <a:ext cx="4912242" cy="369332"/>
+          </a:xfrm>
+          <a:prstGeom prst="rect">
+            <a:avLst/>
+          </a:prstGeom>
+          <a:noFill/>
+        </p:spPr>
+        <p:txBody>
+          <a:bodyPr wrap="square" rtlCol="0">
+            <a:spAutoFit/>
+          </a:bodyPr>
+          <a:lstStyle/>
+          <a:p>
+            <a:r>
+              <a:rPr lang="en-US" dirty="0"/>
+              <a:t>Non constraint optimization also works</a:t>
+            </a:r>
+          </a:p>
+        </p:txBody>
+      </p:sp>
+      <p:sp>
+        <p:nvSpPr>
+          <p:cNvPr id="3" name="TextBox 2">
+            <a:extLst>
+              <a:ext uri="{FF2B5EF4-FFF2-40B4-BE49-F238E27FC236}">
+                <a16:creationId xmlns:a16="http://schemas.microsoft.com/office/drawing/2014/main" id="{09394CA7-1186-D94E-9EAA-F343B8ED1F64}"/>
+              </a:ext>
+            </a:extLst>
+          </p:cNvPr>
+          <p:cNvSpPr txBox="1"/>
+          <p:nvPr/>
+        </p:nvSpPr>
+        <p:spPr>
+          <a:xfrm>
+            <a:off x="340242" y="677676"/>
+            <a:ext cx="6772940" cy="2862322"/>
+          </a:xfrm>
+          <a:prstGeom prst="rect">
+            <a:avLst/>
+          </a:prstGeom>
+          <a:noFill/>
+        </p:spPr>
+        <p:txBody>
+          <a:bodyPr wrap="square" rtlCol="0">
+            <a:spAutoFit/>
+          </a:bodyPr>
+          <a:lstStyle/>
+          <a:p>
+            <a:r>
+              <a:rPr lang="en-US" sz="1200" dirty="0"/>
+              <a:t>&gt;&gt; test(1);</a:t>
+            </a:r>
+          </a:p>
+          <a:p>
+            <a:r>
+              <a:rPr lang="en-US" sz="1200" dirty="0"/>
+              <a:t>Function test() parameters: </a:t>
+            </a:r>
+          </a:p>
+          <a:p>
+            <a:r>
+              <a:rPr lang="en-US" sz="1200" dirty="0" err="1"/>
+              <a:t>init_u_tag</a:t>
+            </a:r>
+            <a:r>
+              <a:rPr lang="en-US" sz="1200" dirty="0"/>
+              <a:t> = 1</a:t>
+            </a:r>
+          </a:p>
+          <a:p>
+            <a:r>
+              <a:rPr lang="en-US" sz="1200" dirty="0" err="1"/>
+              <a:t>enable_normalize</a:t>
+            </a:r>
+            <a:r>
+              <a:rPr lang="en-US" sz="1200" dirty="0"/>
+              <a:t> = 0</a:t>
+            </a:r>
+          </a:p>
+          <a:p>
+            <a:r>
+              <a:rPr lang="en-US" sz="1200" dirty="0" err="1"/>
+              <a:t>enable_damp_newton</a:t>
+            </a:r>
+            <a:r>
+              <a:rPr lang="en-US" sz="1200" dirty="0"/>
+              <a:t> = 0</a:t>
+            </a:r>
+          </a:p>
+          <a:p>
+            <a:r>
+              <a:rPr lang="en-US" sz="1200" dirty="0"/>
+              <a:t>gamma = 1.00e-05</a:t>
+            </a:r>
+          </a:p>
+          <a:p>
+            <a:r>
+              <a:rPr lang="en-US" sz="1200" dirty="0" err="1"/>
+              <a:t>init_d</a:t>
+            </a:r>
+            <a:r>
+              <a:rPr lang="en-US" sz="1200" dirty="0"/>
+              <a:t> =  10.00</a:t>
+            </a:r>
+          </a:p>
+          <a:p>
+            <a:r>
+              <a:rPr lang="en-US" sz="1200" dirty="0"/>
+              <a:t>Function test(): Set </a:t>
+            </a:r>
+            <a:r>
+              <a:rPr lang="en-US" sz="1200" dirty="0" err="1"/>
+              <a:t>update_option</a:t>
+            </a:r>
+            <a:r>
+              <a:rPr lang="en-US" sz="1200" dirty="0"/>
+              <a:t> = 1 ---</a:t>
+            </a:r>
+          </a:p>
+          <a:p>
+            <a:r>
+              <a:rPr lang="en-US" sz="1200" dirty="0" err="1"/>
+              <a:t>Obj</a:t>
+            </a:r>
+            <a:r>
+              <a:rPr lang="en-US" sz="1200" dirty="0"/>
+              <a:t> </a:t>
+            </a:r>
+            <a:r>
+              <a:rPr lang="en-US" sz="1200" dirty="0" err="1"/>
+              <a:t>Func</a:t>
+            </a:r>
+            <a:r>
+              <a:rPr lang="en-US" sz="1200" dirty="0"/>
+              <a:t> 	 Norm J 	 Damping 	 Residual 	 x_0</a:t>
+            </a:r>
+          </a:p>
+          <a:p>
+            <a:r>
+              <a:rPr lang="en-US" sz="1200" dirty="0"/>
+              <a:t>6.900e+01 	  1.600e+01 	 0.00e+00 	 1.00e+01 	 10 </a:t>
+            </a:r>
+          </a:p>
+          <a:p>
+            <a:r>
+              <a:rPr lang="en-US" sz="1200" dirty="0"/>
+              <a:t>5.000e+00 	  0.000e+00 	 1.00e+00 	 0.00e+00 	 2 </a:t>
+            </a:r>
+          </a:p>
+          <a:p>
+            <a:r>
+              <a:rPr lang="en-US" sz="1200" dirty="0"/>
+              <a:t>Number of newton steps: 1 </a:t>
+            </a:r>
+          </a:p>
+          <a:p>
+            <a:r>
+              <a:rPr lang="en-US" sz="1200" dirty="0"/>
+              <a:t>######################## </a:t>
+            </a:r>
+          </a:p>
+          <a:p>
+            <a:endParaRPr lang="en-US" sz="1200" dirty="0"/>
+          </a:p>
+          <a:p>
+            <a:r>
+              <a:rPr lang="en-US" sz="1200" dirty="0"/>
+              <a:t>Elapsed time is 0.011152 seconds.</a:t>
+            </a:r>
+          </a:p>
+        </p:txBody>
+      </p:sp>
+    </p:spTree>
+    <p:extLst>
+      <p:ext uri="{BB962C8B-B14F-4D97-AF65-F5344CB8AC3E}">
+        <p14:creationId xmlns:p14="http://schemas.microsoft.com/office/powerpoint/2010/main" val="3426677151"/>
+      </p:ext>
+    </p:extLst>
+  </p:cSld>
+  <p:clrMapOvr>
+    <a:masterClrMapping/>
+  </p:clrMapOvr>
+</p:sld>
+</file>
+
+<file path=ppt/slides/slide16.xml><?xml version="1.0" encoding="utf-8"?>
+<p:sld xmlns:a="http://schemas.openxmlformats.org/drawingml/2006/main" xmlns:r="http://schemas.openxmlformats.org/officeDocument/2006/relationships" xmlns:p="http://schemas.openxmlformats.org/presentationml/2006/main">
+  <p:cSld>
+    <p:spTree>
+      <p:nvGrpSpPr>
+        <p:cNvPr id="1" name=""/>
+        <p:cNvGrpSpPr/>
+        <p:nvPr/>
+      </p:nvGrpSpPr>
+      <p:grpSpPr>
+        <a:xfrm>
+          <a:off x="0" y="0"/>
+          <a:ext cx="0" cy="0"/>
+          <a:chOff x="0" y="0"/>
+          <a:chExt cx="0" cy="0"/>
+        </a:xfrm>
+      </p:grpSpPr>
+      <p:sp>
+        <p:nvSpPr>
+          <p:cNvPr id="2" name="Rectangle 1">
+            <a:extLst>
+              <a:ext uri="{FF2B5EF4-FFF2-40B4-BE49-F238E27FC236}">
+                <a16:creationId xmlns:a16="http://schemas.microsoft.com/office/drawing/2014/main" id="{FCA69020-DD30-3745-A75C-509C8504CE51}"/>
+              </a:ext>
+            </a:extLst>
+          </p:cNvPr>
+          <p:cNvSpPr/>
+          <p:nvPr/>
+        </p:nvSpPr>
+        <p:spPr>
+          <a:xfrm>
+            <a:off x="372139" y="871227"/>
+            <a:ext cx="8197702" cy="3970318"/>
+          </a:xfrm>
+          <a:prstGeom prst="rect">
+            <a:avLst/>
+          </a:prstGeom>
+        </p:spPr>
+        <p:txBody>
+          <a:bodyPr wrap="square">
+            <a:spAutoFit/>
+          </a:bodyPr>
+          <a:lstStyle/>
+          <a:p>
+            <a:r>
+              <a:rPr lang="en-US" sz="1200" dirty="0"/>
+              <a:t>&gt;&gt; test(5)</a:t>
+            </a:r>
+          </a:p>
+          <a:p>
+            <a:r>
+              <a:rPr lang="en-US" sz="1200" dirty="0"/>
+              <a:t>Function test() parameters: </a:t>
+            </a:r>
+          </a:p>
+          <a:p>
+            <a:r>
+              <a:rPr lang="en-US" sz="1200" dirty="0" err="1"/>
+              <a:t>init_u_tag</a:t>
+            </a:r>
+            <a:r>
+              <a:rPr lang="en-US" sz="1200" dirty="0"/>
+              <a:t> = 1</a:t>
+            </a:r>
+          </a:p>
+          <a:p>
+            <a:r>
+              <a:rPr lang="en-US" sz="1200" dirty="0" err="1"/>
+              <a:t>enable_normalize</a:t>
+            </a:r>
+            <a:r>
+              <a:rPr lang="en-US" sz="1200" dirty="0"/>
+              <a:t> = 0</a:t>
+            </a:r>
+          </a:p>
+          <a:p>
+            <a:r>
+              <a:rPr lang="en-US" sz="1200" dirty="0" err="1"/>
+              <a:t>enable_damp_newton</a:t>
+            </a:r>
+            <a:r>
+              <a:rPr lang="en-US" sz="1200" dirty="0"/>
+              <a:t> = 0</a:t>
+            </a:r>
+          </a:p>
+          <a:p>
+            <a:r>
+              <a:rPr lang="en-US" sz="1200" dirty="0"/>
+              <a:t>gamma = 1.00e-05</a:t>
+            </a:r>
+          </a:p>
+          <a:p>
+            <a:r>
+              <a:rPr lang="en-US" sz="1200" dirty="0" err="1"/>
+              <a:t>init_d</a:t>
+            </a:r>
+            <a:r>
+              <a:rPr lang="en-US" sz="1200" dirty="0"/>
+              <a:t> =   0.00</a:t>
+            </a:r>
+          </a:p>
+          <a:p>
+            <a:r>
+              <a:rPr lang="en-US" sz="1200" dirty="0"/>
+              <a:t>Function test(): Set </a:t>
+            </a:r>
+            <a:r>
+              <a:rPr lang="en-US" sz="1200" dirty="0" err="1"/>
+              <a:t>update_option</a:t>
+            </a:r>
+            <a:r>
+              <a:rPr lang="en-US" sz="1200" dirty="0"/>
+              <a:t> = 1 ---</a:t>
+            </a:r>
+          </a:p>
+          <a:p>
+            <a:r>
+              <a:rPr lang="en-US" sz="1200" dirty="0"/>
+              <a:t>Function test(): Set </a:t>
+            </a:r>
+            <a:r>
+              <a:rPr lang="en-US" sz="1200" dirty="0" err="1"/>
+              <a:t>data.has_constraint</a:t>
+            </a:r>
+            <a:r>
+              <a:rPr lang="en-US" sz="1200" dirty="0"/>
+              <a:t> = 0 ---</a:t>
+            </a:r>
+          </a:p>
+          <a:p>
+            <a:r>
+              <a:rPr lang="en-US" sz="1200" dirty="0" err="1"/>
+              <a:t>Obj</a:t>
+            </a:r>
+            <a:r>
+              <a:rPr lang="en-US" sz="1200" dirty="0"/>
+              <a:t> </a:t>
+            </a:r>
+            <a:r>
+              <a:rPr lang="en-US" sz="1200" dirty="0" err="1"/>
+              <a:t>Func</a:t>
+            </a:r>
+            <a:r>
+              <a:rPr lang="en-US" sz="1200" dirty="0"/>
+              <a:t> 	 Norm J 	 Damping 	 Residual 	 x</a:t>
+            </a:r>
+          </a:p>
+          <a:p>
+            <a:r>
+              <a:rPr lang="en-US" sz="1200" dirty="0"/>
+              <a:t>5.667e+02 	  1.344e+02 	 0.00e+00 	 1.41e+01 	 10  10 </a:t>
+            </a:r>
+          </a:p>
+          <a:p>
+            <a:r>
+              <a:rPr lang="en-US" sz="1200" dirty="0"/>
+              <a:t>4.397e+01 	  3.191e+01 	 1.00e+00 	 0.00e+00 	 5.25        5.25 </a:t>
+            </a:r>
+          </a:p>
+          <a:p>
+            <a:r>
+              <a:rPr lang="en-US" sz="1200" dirty="0"/>
+              <a:t>-1.113e+01 	  6.530e+00 	 1.00e+00 	 0.00e+00 	 3.1012      3.1012 </a:t>
+            </a:r>
+          </a:p>
+          <a:p>
+            <a:r>
+              <a:rPr lang="en-US" sz="1200" dirty="0"/>
+              <a:t>-1.484e+01 	  7.838e-01 	 1.00e+00 	 0.00e+00 	 2.3567      2.3567 </a:t>
+            </a:r>
+          </a:p>
+          <a:p>
+            <a:r>
+              <a:rPr lang="en-US" sz="1200" dirty="0"/>
+              <a:t>-1.491e+01 	  1.955e-02 	 1.00e+00 	 0.00e+00 	 2.2392      2.2392 </a:t>
+            </a:r>
+          </a:p>
+          <a:p>
+            <a:r>
+              <a:rPr lang="en-US" sz="1200" dirty="0"/>
+              <a:t>-1.491e+01 	  1.348e-05 	 1.00e+00 	 0.00e+00 	 2.2361      2.2361 </a:t>
+            </a:r>
+          </a:p>
+          <a:p>
+            <a:r>
+              <a:rPr lang="en-US" sz="1200" dirty="0"/>
+              <a:t>-1.491e+01 	  6.424e-12 	 1.00e+00 	 0.00e+00 	 2.2361      2.2361 </a:t>
+            </a:r>
+          </a:p>
+          <a:p>
+            <a:r>
+              <a:rPr lang="en-US" sz="1200" dirty="0"/>
+              <a:t>Number of newton steps: 6 </a:t>
+            </a:r>
+          </a:p>
+          <a:p>
+            <a:r>
+              <a:rPr lang="en-US" sz="1200" dirty="0"/>
+              <a:t>######################## </a:t>
+            </a:r>
+          </a:p>
+          <a:p>
+            <a:endParaRPr lang="en-US" sz="1200" dirty="0"/>
+          </a:p>
+          <a:p>
+            <a:r>
+              <a:rPr lang="en-US" sz="1200" dirty="0"/>
+              <a:t>Elapsed time is 0.018400 seconds.</a:t>
+            </a:r>
+          </a:p>
+        </p:txBody>
+      </p:sp>
+    </p:spTree>
+    <p:extLst>
+      <p:ext uri="{BB962C8B-B14F-4D97-AF65-F5344CB8AC3E}">
+        <p14:creationId xmlns:p14="http://schemas.microsoft.com/office/powerpoint/2010/main" val="2739442666"/>
       </p:ext>
     </p:extLst>
   </p:cSld>

</xml_diff>

<commit_message>
Merged with the dev branch.
</commit_message>
<xml_diff>
--- a/doc/result_0404_2019.pptx
+++ b/doc/result_0404_2019.pptx
@@ -5,7 +5,7 @@
     <p:sldMasterId id="2147483660" r:id="rId1"/>
   </p:sldMasterIdLst>
   <p:notesMasterIdLst>
-    <p:notesMasterId r:id="rId18"/>
+    <p:notesMasterId r:id="rId14"/>
   </p:notesMasterIdLst>
   <p:sldIdLst>
     <p:sldId id="256" r:id="rId2"/>
@@ -18,12 +18,8 @@
     <p:sldId id="266" r:id="rId9"/>
     <p:sldId id="265" r:id="rId10"/>
     <p:sldId id="276" r:id="rId11"/>
-    <p:sldId id="277" r:id="rId12"/>
-    <p:sldId id="272" r:id="rId13"/>
-    <p:sldId id="273" r:id="rId14"/>
-    <p:sldId id="275" r:id="rId15"/>
-    <p:sldId id="278" r:id="rId16"/>
-    <p:sldId id="279" r:id="rId17"/>
+    <p:sldId id="278" r:id="rId12"/>
+    <p:sldId id="279" r:id="rId13"/>
   </p:sldIdLst>
   <p:sldSz cx="9144000" cy="6858000" type="letter"/>
   <p:notesSz cx="6858000" cy="9144000"/>
@@ -212,7 +208,7 @@
           <a:p>
             <a:fld id="{95CFC698-6045-E54C-ADAA-98F01D9428B8}" type="datetimeFigureOut">
               <a:rPr lang="en-US" smtClean="0"/>
-              <a:t>8/16/19</a:t>
+              <a:t>8/20/19</a:t>
             </a:fld>
             <a:endParaRPr lang="en-US"/>
           </a:p>
@@ -930,90 +926,6 @@
 </p:notes>
 </file>
 
-<file path=ppt/notesSlides/notesSlide6.xml><?xml version="1.0" encoding="utf-8"?>
-<p:notes xmlns:a="http://schemas.openxmlformats.org/drawingml/2006/main" xmlns:r="http://schemas.openxmlformats.org/officeDocument/2006/relationships" xmlns:p="http://schemas.openxmlformats.org/presentationml/2006/main">
-  <p:cSld>
-    <p:spTree>
-      <p:nvGrpSpPr>
-        <p:cNvPr id="1" name=""/>
-        <p:cNvGrpSpPr/>
-        <p:nvPr/>
-      </p:nvGrpSpPr>
-      <p:grpSpPr>
-        <a:xfrm>
-          <a:off x="0" y="0"/>
-          <a:ext cx="0" cy="0"/>
-          <a:chOff x="0" y="0"/>
-          <a:chExt cx="0" cy="0"/>
-        </a:xfrm>
-      </p:grpSpPr>
-      <p:sp>
-        <p:nvSpPr>
-          <p:cNvPr id="2" name="Slide Image Placeholder 1"/>
-          <p:cNvSpPr>
-            <a:spLocks noGrp="1" noRot="1" noChangeAspect="1"/>
-          </p:cNvSpPr>
-          <p:nvPr>
-            <p:ph type="sldImg"/>
-          </p:nvPr>
-        </p:nvSpPr>
-        <p:spPr/>
-      </p:sp>
-      <p:sp>
-        <p:nvSpPr>
-          <p:cNvPr id="3" name="Notes Placeholder 2"/>
-          <p:cNvSpPr>
-            <a:spLocks noGrp="1"/>
-          </p:cNvSpPr>
-          <p:nvPr>
-            <p:ph type="body" idx="1"/>
-          </p:nvPr>
-        </p:nvSpPr>
-        <p:spPr/>
-        <p:txBody>
-          <a:bodyPr/>
-          <a:lstStyle/>
-          <a:p>
-            <a:endParaRPr lang="en-US" dirty="0"/>
-          </a:p>
-        </p:txBody>
-      </p:sp>
-      <p:sp>
-        <p:nvSpPr>
-          <p:cNvPr id="4" name="Slide Number Placeholder 3"/>
-          <p:cNvSpPr>
-            <a:spLocks noGrp="1"/>
-          </p:cNvSpPr>
-          <p:nvPr>
-            <p:ph type="sldNum" sz="quarter" idx="5"/>
-          </p:nvPr>
-        </p:nvSpPr>
-        <p:spPr/>
-        <p:txBody>
-          <a:bodyPr/>
-          <a:lstStyle/>
-          <a:p>
-            <a:fld id="{AA109745-F71C-A340-8D0C-65AACD618045}" type="slidenum">
-              <a:rPr lang="en-US" smtClean="0"/>
-              <a:t>14</a:t>
-            </a:fld>
-            <a:endParaRPr lang="en-US"/>
-          </a:p>
-        </p:txBody>
-      </p:sp>
-    </p:spTree>
-    <p:extLst>
-      <p:ext uri="{BB962C8B-B14F-4D97-AF65-F5344CB8AC3E}">
-        <p14:creationId xmlns:p14="http://schemas.microsoft.com/office/powerpoint/2010/main" val="1152279803"/>
-      </p:ext>
-    </p:extLst>
-  </p:cSld>
-  <p:clrMapOvr>
-    <a:masterClrMapping/>
-  </p:clrMapOvr>
-</p:notes>
-</file>
-
 <file path=ppt/slideLayouts/slideLayout1.xml><?xml version="1.0" encoding="utf-8"?>
 <p:sldLayout xmlns:a="http://schemas.openxmlformats.org/drawingml/2006/main" xmlns:r="http://schemas.openxmlformats.org/officeDocument/2006/relationships" xmlns:p="http://schemas.openxmlformats.org/presentationml/2006/main" type="title" preserve="1">
   <p:cSld name="Title Slide">
@@ -1145,7 +1057,7 @@
           <a:p>
             <a:fld id="{D83CE7CA-FC5D-A143-9604-17C710325B9A}" type="datetimeFigureOut">
               <a:rPr lang="en-US" smtClean="0"/>
-              <a:t>8/16/19</a:t>
+              <a:t>8/20/19</a:t>
             </a:fld>
             <a:endParaRPr lang="en-US"/>
           </a:p>
@@ -1315,7 +1227,7 @@
           <a:p>
             <a:fld id="{D83CE7CA-FC5D-A143-9604-17C710325B9A}" type="datetimeFigureOut">
               <a:rPr lang="en-US" smtClean="0"/>
-              <a:t>8/16/19</a:t>
+              <a:t>8/20/19</a:t>
             </a:fld>
             <a:endParaRPr lang="en-US"/>
           </a:p>
@@ -1495,7 +1407,7 @@
           <a:p>
             <a:fld id="{D83CE7CA-FC5D-A143-9604-17C710325B9A}" type="datetimeFigureOut">
               <a:rPr lang="en-US" smtClean="0"/>
-              <a:t>8/16/19</a:t>
+              <a:t>8/20/19</a:t>
             </a:fld>
             <a:endParaRPr lang="en-US"/>
           </a:p>
@@ -1665,7 +1577,7 @@
           <a:p>
             <a:fld id="{D83CE7CA-FC5D-A143-9604-17C710325B9A}" type="datetimeFigureOut">
               <a:rPr lang="en-US" smtClean="0"/>
-              <a:t>8/16/19</a:t>
+              <a:t>8/20/19</a:t>
             </a:fld>
             <a:endParaRPr lang="en-US"/>
           </a:p>
@@ -1909,7 +1821,7 @@
           <a:p>
             <a:fld id="{D83CE7CA-FC5D-A143-9604-17C710325B9A}" type="datetimeFigureOut">
               <a:rPr lang="en-US" smtClean="0"/>
-              <a:t>8/16/19</a:t>
+              <a:t>8/20/19</a:t>
             </a:fld>
             <a:endParaRPr lang="en-US"/>
           </a:p>
@@ -2141,7 +2053,7 @@
           <a:p>
             <a:fld id="{D83CE7CA-FC5D-A143-9604-17C710325B9A}" type="datetimeFigureOut">
               <a:rPr lang="en-US" smtClean="0"/>
-              <a:t>8/16/19</a:t>
+              <a:t>8/20/19</a:t>
             </a:fld>
             <a:endParaRPr lang="en-US"/>
           </a:p>
@@ -2508,7 +2420,7 @@
           <a:p>
             <a:fld id="{D83CE7CA-FC5D-A143-9604-17C710325B9A}" type="datetimeFigureOut">
               <a:rPr lang="en-US" smtClean="0"/>
-              <a:t>8/16/19</a:t>
+              <a:t>8/20/19</a:t>
             </a:fld>
             <a:endParaRPr lang="en-US"/>
           </a:p>
@@ -2626,7 +2538,7 @@
           <a:p>
             <a:fld id="{D83CE7CA-FC5D-A143-9604-17C710325B9A}" type="datetimeFigureOut">
               <a:rPr lang="en-US" smtClean="0"/>
-              <a:t>8/16/19</a:t>
+              <a:t>8/20/19</a:t>
             </a:fld>
             <a:endParaRPr lang="en-US"/>
           </a:p>
@@ -2721,7 +2633,7 @@
           <a:p>
             <a:fld id="{D83CE7CA-FC5D-A143-9604-17C710325B9A}" type="datetimeFigureOut">
               <a:rPr lang="en-US" smtClean="0"/>
-              <a:t>8/16/19</a:t>
+              <a:t>8/20/19</a:t>
             </a:fld>
             <a:endParaRPr lang="en-US"/>
           </a:p>
@@ -2998,7 +2910,7 @@
           <a:p>
             <a:fld id="{D83CE7CA-FC5D-A143-9604-17C710325B9A}" type="datetimeFigureOut">
               <a:rPr lang="en-US" smtClean="0"/>
-              <a:t>8/16/19</a:t>
+              <a:t>8/20/19</a:t>
             </a:fld>
             <a:endParaRPr lang="en-US"/>
           </a:p>
@@ -3255,7 +3167,7 @@
           <a:p>
             <a:fld id="{D83CE7CA-FC5D-A143-9604-17C710325B9A}" type="datetimeFigureOut">
               <a:rPr lang="en-US" smtClean="0"/>
-              <a:t>8/16/19</a:t>
+              <a:t>8/20/19</a:t>
             </a:fld>
             <a:endParaRPr lang="en-US"/>
           </a:p>
@@ -3468,7 +3380,7 @@
           <a:p>
             <a:fld id="{D83CE7CA-FC5D-A143-9604-17C710325B9A}" type="datetimeFigureOut">
               <a:rPr lang="en-US" smtClean="0"/>
-              <a:t>8/16/19</a:t>
+              <a:t>8/20/19</a:t>
             </a:fld>
             <a:endParaRPr lang="en-US"/>
           </a:p>
@@ -3940,7 +3852,7 @@
             </a:r>
             <a:r>
               <a:rPr lang="en-US" dirty="0" err="1"/>
-              <a:t>test_case</a:t>
+              <a:t>cell_name</a:t>
             </a:r>
             <a:r>
               <a:rPr lang="en-US" dirty="0"/>
@@ -3950,31 +3862,31 @@
           <a:p>
             <a:r>
               <a:rPr lang="en-US" dirty="0"/>
-              <a:t>%            1 -- spot diffusion</a:t>
+              <a:t>%            spot -- spot diffusion</a:t>
             </a:r>
           </a:p>
           <a:p>
             <a:r>
               <a:rPr lang="en-US" dirty="0"/>
-              <a:t>%            2 -- layered diffusion</a:t>
+              <a:t>%            layered -- layered diffusion</a:t>
             </a:r>
           </a:p>
           <a:p>
             <a:r>
               <a:rPr lang="en-US" dirty="0"/>
-              <a:t>%            3 -- tensor diffusion</a:t>
+              <a:t>%            tensor -- tensor diffusion</a:t>
             </a:r>
           </a:p>
           <a:p>
             <a:r>
               <a:rPr lang="en-US" dirty="0"/>
-              <a:t>%            4 -- tensor cross  diffusion</a:t>
+              <a:t>%            tensor cross -- tensor cross  diffusion</a:t>
             </a:r>
           </a:p>
           <a:p>
             <a:r>
               <a:rPr lang="en-US" dirty="0"/>
-              <a:t>%            5 -- mem17 diffusion </a:t>
+              <a:t>%            mem17 -- mem17 diffusion </a:t>
             </a:r>
           </a:p>
         </p:txBody>
@@ -4414,7 +4326,7 @@
           <p:cNvPr id="2" name="TextBox 1">
             <a:extLst>
               <a:ext uri="{FF2B5EF4-FFF2-40B4-BE49-F238E27FC236}">
-                <a16:creationId xmlns:a16="http://schemas.microsoft.com/office/drawing/2014/main" id="{610C8002-1235-3749-B811-156523F3C531}"/>
+                <a16:creationId xmlns:a16="http://schemas.microsoft.com/office/drawing/2014/main" id="{25F0815D-E644-5642-8727-F848A86EEBA2}"/>
               </a:ext>
             </a:extLst>
           </p:cNvPr>
@@ -4423,8 +4335,8 @@
         </p:nvSpPr>
         <p:spPr>
           <a:xfrm>
-            <a:off x="520700" y="115044"/>
-            <a:ext cx="7493000" cy="6186309"/>
+            <a:off x="340242" y="308344"/>
+            <a:ext cx="4912242" cy="369332"/>
           </a:xfrm>
           <a:prstGeom prst="rect">
             <a:avLst/>
@@ -4438,239 +4350,160 @@
           <a:lstStyle/>
           <a:p>
             <a:r>
-              <a:rPr lang="en-US" b="1" dirty="0"/>
-              <a:t>H3K9me converged to very small diffusion coefficients. </a:t>
-            </a:r>
-            <a:endParaRPr lang="en-US" dirty="0"/>
-          </a:p>
-          <a:p>
-            <a:r>
-              <a:rPr lang="en-US" sz="1400" dirty="0"/>
-              <a:t>&gt;&gt; test('h3k9’);</a:t>
-            </a:r>
-          </a:p>
-          <a:p>
-            <a:r>
-              <a:rPr lang="en-US" sz="1400" dirty="0"/>
+              <a:rPr lang="en-US" dirty="0"/>
+              <a:t>Non constraint optimization also works</a:t>
+            </a:r>
+          </a:p>
+        </p:txBody>
+      </p:sp>
+      <p:sp>
+        <p:nvSpPr>
+          <p:cNvPr id="3" name="TextBox 2">
+            <a:extLst>
+              <a:ext uri="{FF2B5EF4-FFF2-40B4-BE49-F238E27FC236}">
+                <a16:creationId xmlns:a16="http://schemas.microsoft.com/office/drawing/2014/main" id="{09394CA7-1186-D94E-9EAA-F343B8ED1F64}"/>
+              </a:ext>
+            </a:extLst>
+          </p:cNvPr>
+          <p:cNvSpPr txBox="1"/>
+          <p:nvPr/>
+        </p:nvSpPr>
+        <p:spPr>
+          <a:xfrm>
+            <a:off x="340242" y="677676"/>
+            <a:ext cx="6772940" cy="2862322"/>
+          </a:xfrm>
+          <a:prstGeom prst="rect">
+            <a:avLst/>
+          </a:prstGeom>
+          <a:noFill/>
+        </p:spPr>
+        <p:txBody>
+          <a:bodyPr wrap="square" rtlCol="0">
+            <a:spAutoFit/>
+          </a:bodyPr>
+          <a:lstStyle/>
+          <a:p>
+            <a:r>
+              <a:rPr lang="en-US" sz="1200" dirty="0"/>
+              <a:t>&gt;&gt; test(1);</a:t>
+            </a:r>
+          </a:p>
+          <a:p>
+            <a:r>
+              <a:rPr lang="en-US" sz="1200" dirty="0"/>
               <a:t>Function test() parameters: </a:t>
             </a:r>
           </a:p>
           <a:p>
             <a:r>
-              <a:rPr lang="en-US" sz="1400" dirty="0" err="1"/>
-              <a:t>test_case</a:t>
-            </a:r>
-            <a:r>
-              <a:rPr lang="en-US" sz="1400" dirty="0"/>
-              <a:t> = 6</a:t>
-            </a:r>
-          </a:p>
-          <a:p>
-            <a:r>
-              <a:rPr lang="en-US" sz="1400" dirty="0" err="1"/>
+              <a:rPr lang="en-US" sz="1200" dirty="0" err="1"/>
               <a:t>init_u_tag</a:t>
             </a:r>
             <a:r>
-              <a:rPr lang="en-US" sz="1400" dirty="0"/>
-              <a:t> = 2</a:t>
-            </a:r>
-          </a:p>
-          <a:p>
-            <a:r>
-              <a:rPr lang="en-US" sz="1400" dirty="0" err="1"/>
+              <a:rPr lang="en-US" sz="1200" dirty="0"/>
+              <a:t> = 1</a:t>
+            </a:r>
+          </a:p>
+          <a:p>
+            <a:r>
+              <a:rPr lang="en-US" sz="1200" dirty="0" err="1"/>
               <a:t>enable_normalize</a:t>
             </a:r>
             <a:r>
-              <a:rPr lang="en-US" sz="1400" dirty="0"/>
-              <a:t> = 1</a:t>
-            </a:r>
-          </a:p>
-          <a:p>
-            <a:r>
-              <a:rPr lang="en-US" sz="1400" dirty="0" err="1"/>
+              <a:rPr lang="en-US" sz="1200" dirty="0"/>
+              <a:t> = 0</a:t>
+            </a:r>
+          </a:p>
+          <a:p>
+            <a:r>
+              <a:rPr lang="en-US" sz="1200" dirty="0" err="1"/>
               <a:t>enable_damp_newton</a:t>
             </a:r>
             <a:r>
-              <a:rPr lang="en-US" sz="1400" dirty="0"/>
-              <a:t> = 1</a:t>
-            </a:r>
-          </a:p>
-          <a:p>
-            <a:r>
-              <a:rPr lang="en-US" sz="1400" dirty="0"/>
-              <a:t>gamma = 1.00e+00</a:t>
-            </a:r>
-          </a:p>
-          <a:p>
-            <a:r>
-              <a:rPr lang="en-US" sz="1400" dirty="0" err="1"/>
+              <a:rPr lang="en-US" sz="1200" dirty="0"/>
+              <a:t> = 0</a:t>
+            </a:r>
+          </a:p>
+          <a:p>
+            <a:r>
+              <a:rPr lang="en-US" sz="1200" dirty="0"/>
+              <a:t>gamma = 1.00e-05</a:t>
+            </a:r>
+          </a:p>
+          <a:p>
+            <a:r>
+              <a:rPr lang="en-US" sz="1200" dirty="0" err="1"/>
               <a:t>init_d</a:t>
             </a:r>
             <a:r>
-              <a:rPr lang="en-US" sz="1400" dirty="0"/>
+              <a:rPr lang="en-US" sz="1200" dirty="0"/>
               <a:t> =  10.00</a:t>
             </a:r>
           </a:p>
           <a:p>
             <a:r>
-              <a:rPr lang="en-US" sz="1400" dirty="0"/>
+              <a:rPr lang="en-US" sz="1200" dirty="0"/>
               <a:t>Function test(): Set </a:t>
             </a:r>
             <a:r>
-              <a:rPr lang="en-US" sz="1400" dirty="0" err="1"/>
+              <a:rPr lang="en-US" sz="1200" dirty="0" err="1"/>
               <a:t>update_option</a:t>
             </a:r>
             <a:r>
-              <a:rPr lang="en-US" sz="1400" dirty="0"/>
-              <a:t> = 2 ---</a:t>
-            </a:r>
-          </a:p>
-          <a:p>
-            <a:r>
-              <a:rPr lang="en-US" sz="1400" dirty="0"/>
-              <a:t>Function test(): Set magnification = 99 ---</a:t>
-            </a:r>
-          </a:p>
-          <a:p>
-            <a:r>
-              <a:rPr lang="en-US" sz="1400" dirty="0" err="1"/>
+              <a:rPr lang="en-US" sz="1200" dirty="0"/>
+              <a:t> = 1 ---</a:t>
+            </a:r>
+          </a:p>
+          <a:p>
+            <a:r>
+              <a:rPr lang="en-US" sz="1200" dirty="0" err="1"/>
               <a:t>Obj</a:t>
             </a:r>
             <a:r>
-              <a:rPr lang="en-US" sz="1400" dirty="0"/>
+              <a:rPr lang="en-US" sz="1200" dirty="0"/>
               <a:t> </a:t>
             </a:r>
             <a:r>
-              <a:rPr lang="en-US" sz="1400" dirty="0" err="1"/>
+              <a:rPr lang="en-US" sz="1200" dirty="0" err="1"/>
               <a:t>Func</a:t>
             </a:r>
             <a:r>
-              <a:rPr lang="en-US" sz="1400" dirty="0"/>
-              <a:t> 	 Norm J 	 Damping 	 Residual 	 Diffusion Coefficients</a:t>
-            </a:r>
-          </a:p>
-          <a:p>
-            <a:r>
-              <a:rPr lang="en-US" sz="1400" dirty="0"/>
-              <a:t>0.000e+00 	  3.100e+04 	 0.00e+00 	 0.00e+00 	 0.0057696    0.015168 </a:t>
-            </a:r>
-          </a:p>
-          <a:p>
-            <a:r>
-              <a:rPr lang="en-US" sz="1400" dirty="0"/>
-              <a:t>-1.565e+01 	  4.324e+01 	 1.00e+00 	 1.06e+01 	 0  0 </a:t>
-            </a:r>
-          </a:p>
-          <a:p>
-            <a:r>
-              <a:rPr lang="en-US" sz="1400" dirty="0"/>
-              <a:t>-2.375e+01 	  6.373e-02 	 1.00e+00 	 2.97e+01 	 0  8.4781e-08 </a:t>
-            </a:r>
-          </a:p>
-          <a:p>
-            <a:r>
-              <a:rPr lang="en-US" sz="1400" dirty="0"/>
-              <a:t>-2.382e+01 	  5.118e-02 	 1.36e-01 	 2.97e+01 	 0  9.5158e-08 </a:t>
-            </a:r>
-          </a:p>
-          <a:p>
-            <a:r>
-              <a:rPr lang="en-US" sz="1400" dirty="0"/>
-              <a:t>-2.383e+01 	  5.028e-02 	 1.92e-02 	 2.97e+01 	 0  1.0552e-07 </a:t>
-            </a:r>
-          </a:p>
-          <a:p>
-            <a:r>
-              <a:rPr lang="en-US" sz="1400" dirty="0"/>
-              <a:t>-2.384e+01 	  4.936e-02 	 1.95e-02 	 2.97e+01 	 0  1.1586e-07 </a:t>
-            </a:r>
-          </a:p>
-          <a:p>
-            <a:r>
-              <a:rPr lang="en-US" sz="1400" dirty="0"/>
-              <a:t>……</a:t>
-            </a:r>
-          </a:p>
-          <a:p>
-            <a:r>
-              <a:rPr lang="en-US" sz="1400" dirty="0"/>
-              <a:t>Number of newton steps: 10 </a:t>
-            </a:r>
-          </a:p>
-          <a:p>
-            <a:r>
-              <a:rPr lang="en-US" sz="1400" dirty="0"/>
+              <a:rPr lang="en-US" sz="1200" dirty="0"/>
+              <a:t> 	 Norm J 	 Damping 	 Residual 	 x_0</a:t>
+            </a:r>
+          </a:p>
+          <a:p>
+            <a:r>
+              <a:rPr lang="en-US" sz="1200" dirty="0"/>
+              <a:t>6.900e+01 	  1.600e+01 	 0.00e+00 	 1.00e+01 	 10 </a:t>
+            </a:r>
+          </a:p>
+          <a:p>
+            <a:r>
+              <a:rPr lang="en-US" sz="1200" dirty="0"/>
+              <a:t>5.000e+00 	  0.000e+00 	 1.00e+00 	 0.00e+00 	 2 </a:t>
+            </a:r>
+          </a:p>
+          <a:p>
+            <a:r>
+              <a:rPr lang="en-US" sz="1200" dirty="0"/>
+              <a:t>Number of newton steps: 1 </a:t>
+            </a:r>
+          </a:p>
+          <a:p>
+            <a:r>
+              <a:rPr lang="en-US" sz="1200" dirty="0"/>
               <a:t>######################## </a:t>
             </a:r>
           </a:p>
           <a:p>
-            <a:r>
-              <a:rPr lang="en-US" sz="1400" dirty="0"/>
-              <a:t>……</a:t>
-            </a:r>
-          </a:p>
-          <a:p>
-            <a:r>
-              <a:rPr lang="en-US" sz="1400" dirty="0" err="1"/>
-              <a:t>Obj</a:t>
-            </a:r>
-            <a:r>
-              <a:rPr lang="en-US" sz="1400" dirty="0"/>
-              <a:t> </a:t>
-            </a:r>
-            <a:r>
-              <a:rPr lang="en-US" sz="1400" dirty="0" err="1"/>
-              <a:t>Func</a:t>
-            </a:r>
-            <a:r>
-              <a:rPr lang="en-US" sz="1400" dirty="0"/>
-              <a:t> 	 Norm J 	 Damping 	 Residual 	 Diffusion Coefficients</a:t>
-            </a:r>
-          </a:p>
-          <a:p>
-            <a:r>
-              <a:rPr lang="en-US" sz="1400" dirty="0"/>
-              <a:t>Function </a:t>
-            </a:r>
-            <a:r>
-              <a:rPr lang="en-US" sz="1400" dirty="0" err="1"/>
-              <a:t>compute_objective</a:t>
-            </a:r>
-            <a:r>
-              <a:rPr lang="en-US" sz="1400" dirty="0"/>
-              <a:t>(): abs(</a:t>
-            </a:r>
-            <a:r>
-              <a:rPr lang="en-US" sz="1400" dirty="0" err="1"/>
-              <a:t>dd</a:t>
-            </a:r>
-            <a:r>
-              <a:rPr lang="en-US" sz="1400" dirty="0"/>
-              <a:t>)&lt;=eps, do not normalize ---</a:t>
-            </a:r>
-          </a:p>
-          <a:p>
-            <a:r>
-              <a:rPr lang="en-US" sz="1400" dirty="0"/>
-              <a:t>-2.428e+01 	  1.075e-02 	 0.00e+00 	 3.01e+01 	 0  6.2966e-07 </a:t>
-            </a:r>
-          </a:p>
-          <a:p>
-            <a:r>
-              <a:rPr lang="en-US" sz="1400" dirty="0"/>
-              <a:t>Number of newton steps: 1 </a:t>
-            </a:r>
-          </a:p>
-          <a:p>
-            <a:r>
-              <a:rPr lang="en-US" sz="1400" dirty="0"/>
-              <a:t>######################## </a:t>
-            </a:r>
-          </a:p>
-          <a:p>
-            <a:r>
-              <a:rPr lang="en-US" sz="1400" dirty="0"/>
-              <a:t>Elapsed time is 11.216736 seconds.</a:t>
+            <a:endParaRPr lang="en-US" sz="1200" dirty="0"/>
+          </a:p>
+          <a:p>
+            <a:r>
+              <a:rPr lang="en-US" sz="1200" dirty="0"/>
+              <a:t>Elapsed time is 0.011152 seconds.</a:t>
             </a:r>
           </a:p>
         </p:txBody>
@@ -4678,7 +4511,7 @@
     </p:spTree>
     <p:extLst>
       <p:ext uri="{BB962C8B-B14F-4D97-AF65-F5344CB8AC3E}">
-        <p14:creationId xmlns:p14="http://schemas.microsoft.com/office/powerpoint/2010/main" val="4115839406"/>
+        <p14:creationId xmlns:p14="http://schemas.microsoft.com/office/powerpoint/2010/main" val="1777340484"/>
       </p:ext>
     </p:extLst>
   </p:cSld>
@@ -4707,807 +4540,6 @@
       </p:grpSpPr>
       <p:sp>
         <p:nvSpPr>
-          <p:cNvPr id="2" name="TextBox 1">
-            <a:extLst>
-              <a:ext uri="{FF2B5EF4-FFF2-40B4-BE49-F238E27FC236}">
-                <a16:creationId xmlns:a16="http://schemas.microsoft.com/office/drawing/2014/main" id="{26A68757-28D3-E54B-826A-73D56E725A5C}"/>
-              </a:ext>
-            </a:extLst>
-          </p:cNvPr>
-          <p:cNvSpPr txBox="1"/>
-          <p:nvPr/>
-        </p:nvSpPr>
-        <p:spPr>
-          <a:xfrm>
-            <a:off x="457200" y="174446"/>
-            <a:ext cx="8229600" cy="1754326"/>
-          </a:xfrm>
-          <a:prstGeom prst="rect">
-            <a:avLst/>
-          </a:prstGeom>
-          <a:noFill/>
-        </p:spPr>
-        <p:txBody>
-          <a:bodyPr wrap="square" rtlCol="0">
-            <a:spAutoFit/>
-          </a:bodyPr>
-          <a:lstStyle/>
-          <a:p>
-            <a:r>
-              <a:rPr lang="en-US" b="1" dirty="0"/>
-              <a:t>Generate new simulation with continuous diffusion coefficients </a:t>
-            </a:r>
-            <a:r>
-              <a:rPr lang="en-US" dirty="0"/>
-              <a:t>using the </a:t>
-            </a:r>
-            <a:r>
-              <a:rPr lang="en-US" dirty="0" err="1"/>
-              <a:t>diffusion_analysis</a:t>
-            </a:r>
-            <a:r>
-              <a:rPr lang="en-US" dirty="0"/>
-              <a:t> package and the input data in  “simulation/</a:t>
-            </a:r>
-            <a:r>
-              <a:rPr lang="en-US" dirty="0" err="1"/>
-              <a:t>layered_diffusion_general</a:t>
-            </a:r>
-            <a:r>
-              <a:rPr lang="en-US" dirty="0"/>
-              <a:t>”</a:t>
-            </a:r>
-          </a:p>
-          <a:p>
-            <a:r>
-              <a:rPr lang="en-US" dirty="0"/>
-              <a:t>&gt;&gt; </a:t>
-            </a:r>
-            <a:r>
-              <a:rPr lang="en-US" dirty="0" err="1"/>
-              <a:t>cell_name</a:t>
-            </a:r>
-            <a:r>
-              <a:rPr lang="en-US" dirty="0"/>
-              <a:t> = '</a:t>
-            </a:r>
-            <a:r>
-              <a:rPr lang="en-US" dirty="0" err="1"/>
-              <a:t>layered_diffusion_general</a:t>
-            </a:r>
-            <a:r>
-              <a:rPr lang="en-US" dirty="0"/>
-              <a:t>';</a:t>
-            </a:r>
-          </a:p>
-          <a:p>
-            <a:r>
-              <a:rPr lang="en-US" dirty="0"/>
-              <a:t>&gt;&gt; data = </a:t>
-            </a:r>
-            <a:r>
-              <a:rPr lang="en-US" dirty="0" err="1"/>
-              <a:t>sample_diffusion_init_data</a:t>
-            </a:r>
-            <a:r>
-              <a:rPr lang="en-US" dirty="0"/>
-              <a:t>(</a:t>
-            </a:r>
-            <a:r>
-              <a:rPr lang="en-US" dirty="0" err="1"/>
-              <a:t>cell_name</a:t>
-            </a:r>
-            <a:r>
-              <a:rPr lang="en-US" dirty="0"/>
-              <a:t>);</a:t>
-            </a:r>
-          </a:p>
-          <a:p>
-            <a:r>
-              <a:rPr lang="en-US" dirty="0"/>
-              <a:t>&gt;&gt; </a:t>
-            </a:r>
-            <a:r>
-              <a:rPr lang="en-US" dirty="0" err="1"/>
-              <a:t>computer_simulation</a:t>
-            </a:r>
-            <a:r>
-              <a:rPr lang="en-US" dirty="0"/>
-              <a:t>(data);</a:t>
-            </a:r>
-          </a:p>
-        </p:txBody>
-      </p:sp>
-      <p:pic>
-        <p:nvPicPr>
-          <p:cNvPr id="7" name="Picture 6">
-            <a:extLst>
-              <a:ext uri="{FF2B5EF4-FFF2-40B4-BE49-F238E27FC236}">
-                <a16:creationId xmlns:a16="http://schemas.microsoft.com/office/drawing/2014/main" id="{1DB0D46A-6E89-8040-9527-0ADC36FD857B}"/>
-              </a:ext>
-            </a:extLst>
-          </p:cNvPr>
-          <p:cNvPicPr>
-            <a:picLocks noChangeAspect="1"/>
-          </p:cNvPicPr>
-          <p:nvPr/>
-        </p:nvPicPr>
-        <p:blipFill>
-          <a:blip r:embed="rId2"/>
-          <a:stretch>
-            <a:fillRect/>
-          </a:stretch>
-        </p:blipFill>
-        <p:spPr>
-          <a:xfrm>
-            <a:off x="457200" y="1928772"/>
-            <a:ext cx="8229600" cy="4822906"/>
-          </a:xfrm>
-          <a:prstGeom prst="rect">
-            <a:avLst/>
-          </a:prstGeom>
-        </p:spPr>
-      </p:pic>
-    </p:spTree>
-    <p:extLst>
-      <p:ext uri="{BB962C8B-B14F-4D97-AF65-F5344CB8AC3E}">
-        <p14:creationId xmlns:p14="http://schemas.microsoft.com/office/powerpoint/2010/main" val="35029894"/>
-      </p:ext>
-    </p:extLst>
-  </p:cSld>
-  <p:clrMapOvr>
-    <a:masterClrMapping/>
-  </p:clrMapOvr>
-</p:sld>
-</file>
-
-<file path=ppt/slides/slide13.xml><?xml version="1.0" encoding="utf-8"?>
-<p:sld xmlns:a="http://schemas.openxmlformats.org/drawingml/2006/main" xmlns:r="http://schemas.openxmlformats.org/officeDocument/2006/relationships" xmlns:p="http://schemas.openxmlformats.org/presentationml/2006/main">
-  <p:cSld>
-    <p:spTree>
-      <p:nvGrpSpPr>
-        <p:cNvPr id="1" name=""/>
-        <p:cNvGrpSpPr/>
-        <p:nvPr/>
-      </p:nvGrpSpPr>
-      <p:grpSpPr>
-        <a:xfrm>
-          <a:off x="0" y="0"/>
-          <a:ext cx="0" cy="0"/>
-          <a:chOff x="0" y="0"/>
-          <a:chExt cx="0" cy="0"/>
-        </a:xfrm>
-      </p:grpSpPr>
-      <p:pic>
-        <p:nvPicPr>
-          <p:cNvPr id="3" name="Picture 2">
-            <a:extLst>
-              <a:ext uri="{FF2B5EF4-FFF2-40B4-BE49-F238E27FC236}">
-                <a16:creationId xmlns:a16="http://schemas.microsoft.com/office/drawing/2014/main" id="{26F8DC74-7488-FF49-AAE6-7D2609016650}"/>
-              </a:ext>
-            </a:extLst>
-          </p:cNvPr>
-          <p:cNvPicPr>
-            <a:picLocks noChangeAspect="1"/>
-          </p:cNvPicPr>
-          <p:nvPr/>
-        </p:nvPicPr>
-        <p:blipFill>
-          <a:blip r:embed="rId2"/>
-          <a:stretch>
-            <a:fillRect/>
-          </a:stretch>
-        </p:blipFill>
-        <p:spPr>
-          <a:xfrm>
-            <a:off x="0" y="0"/>
-            <a:ext cx="9144000" cy="4548249"/>
-          </a:xfrm>
-          <a:prstGeom prst="rect">
-            <a:avLst/>
-          </a:prstGeom>
-        </p:spPr>
-      </p:pic>
-      <p:pic>
-        <p:nvPicPr>
-          <p:cNvPr id="4" name="Picture 3">
-            <a:extLst>
-              <a:ext uri="{FF2B5EF4-FFF2-40B4-BE49-F238E27FC236}">
-                <a16:creationId xmlns:a16="http://schemas.microsoft.com/office/drawing/2014/main" id="{09B9B8EB-2783-8D4C-95AC-AF6270CD26D0}"/>
-              </a:ext>
-            </a:extLst>
-          </p:cNvPr>
-          <p:cNvPicPr>
-            <a:picLocks noChangeAspect="1"/>
-          </p:cNvPicPr>
-          <p:nvPr/>
-        </p:nvPicPr>
-        <p:blipFill>
-          <a:blip r:embed="rId3"/>
-          <a:stretch>
-            <a:fillRect/>
-          </a:stretch>
-        </p:blipFill>
-        <p:spPr>
-          <a:xfrm>
-            <a:off x="59377" y="4548249"/>
-            <a:ext cx="8906493" cy="2309078"/>
-          </a:xfrm>
-          <a:prstGeom prst="rect">
-            <a:avLst/>
-          </a:prstGeom>
-        </p:spPr>
-      </p:pic>
-    </p:spTree>
-    <p:extLst>
-      <p:ext uri="{BB962C8B-B14F-4D97-AF65-F5344CB8AC3E}">
-        <p14:creationId xmlns:p14="http://schemas.microsoft.com/office/powerpoint/2010/main" val="3276503512"/>
-      </p:ext>
-    </p:extLst>
-  </p:cSld>
-  <p:clrMapOvr>
-    <a:masterClrMapping/>
-  </p:clrMapOvr>
-</p:sld>
-</file>
-
-<file path=ppt/slides/slide14.xml><?xml version="1.0" encoding="utf-8"?>
-<p:sld xmlns:a="http://schemas.openxmlformats.org/drawingml/2006/main" xmlns:r="http://schemas.openxmlformats.org/officeDocument/2006/relationships" xmlns:p="http://schemas.openxmlformats.org/presentationml/2006/main">
-  <p:cSld>
-    <p:spTree>
-      <p:nvGrpSpPr>
-        <p:cNvPr id="1" name=""/>
-        <p:cNvGrpSpPr/>
-        <p:nvPr/>
-      </p:nvGrpSpPr>
-      <p:grpSpPr>
-        <a:xfrm>
-          <a:off x="0" y="0"/>
-          <a:ext cx="0" cy="0"/>
-          <a:chOff x="0" y="0"/>
-          <a:chExt cx="0" cy="0"/>
-        </a:xfrm>
-      </p:grpSpPr>
-      <p:sp>
-        <p:nvSpPr>
-          <p:cNvPr id="2" name="TextBox 1">
-            <a:extLst>
-              <a:ext uri="{FF2B5EF4-FFF2-40B4-BE49-F238E27FC236}">
-                <a16:creationId xmlns:a16="http://schemas.microsoft.com/office/drawing/2014/main" id="{BD19F6ED-5A1B-9145-A811-0D21D5A61AC7}"/>
-              </a:ext>
-            </a:extLst>
-          </p:cNvPr>
-          <p:cNvSpPr txBox="1"/>
-          <p:nvPr/>
-        </p:nvSpPr>
-        <p:spPr>
-          <a:xfrm>
-            <a:off x="225631" y="178130"/>
-            <a:ext cx="8372104" cy="2031325"/>
-          </a:xfrm>
-          <a:prstGeom prst="rect">
-            <a:avLst/>
-          </a:prstGeom>
-          <a:noFill/>
-        </p:spPr>
-        <p:txBody>
-          <a:bodyPr wrap="square" rtlCol="0">
-            <a:spAutoFit/>
-          </a:bodyPr>
-          <a:lstStyle/>
-          <a:p>
-            <a:r>
-              <a:rPr lang="en-US" b="1" dirty="0"/>
-              <a:t>The simulation results should be saved in the file “output/layered_diffusion_general_5_refined.mat” </a:t>
-            </a:r>
-            <a:r>
-              <a:rPr lang="en-US" dirty="0"/>
-              <a:t>and then used as the input for the optimization programs. </a:t>
-            </a:r>
-          </a:p>
-          <a:p>
-            <a:endParaRPr lang="en-US" dirty="0"/>
-          </a:p>
-          <a:p>
-            <a:pPr marL="342900" indent="-342900">
-              <a:buAutoNum type="arabicParenBoth"/>
-            </a:pPr>
-            <a:r>
-              <a:rPr lang="en-US" dirty="0">
-                <a:solidFill>
-                  <a:srgbClr val="FF0000"/>
-                </a:solidFill>
-              </a:rPr>
-              <a:t>We are testing this in </a:t>
-            </a:r>
-            <a:r>
-              <a:rPr lang="en-US" dirty="0" err="1">
-                <a:solidFill>
-                  <a:srgbClr val="FF0000"/>
-                </a:solidFill>
-              </a:rPr>
-              <a:t>opt_pde</a:t>
-            </a:r>
-            <a:r>
-              <a:rPr lang="en-US" dirty="0">
-                <a:solidFill>
-                  <a:srgbClr val="FF0000"/>
-                </a:solidFill>
-              </a:rPr>
-              <a:t>/app/</a:t>
-            </a:r>
-            <a:r>
-              <a:rPr lang="en-US" dirty="0" err="1">
-                <a:solidFill>
-                  <a:srgbClr val="FF0000"/>
-                </a:solidFill>
-              </a:rPr>
-              <a:t>test.m</a:t>
-            </a:r>
-            <a:endParaRPr lang="en-US" dirty="0">
-              <a:solidFill>
-                <a:srgbClr val="FF0000"/>
-              </a:solidFill>
-            </a:endParaRPr>
-          </a:p>
-          <a:p>
-            <a:pPr marL="342900" indent="-342900">
-              <a:buAutoNum type="arabicParenBoth"/>
-            </a:pPr>
-            <a:r>
-              <a:rPr lang="en-US" dirty="0">
-                <a:solidFill>
-                  <a:srgbClr val="FF0000"/>
-                </a:solidFill>
-              </a:rPr>
-              <a:t>Need to incorporate </a:t>
-            </a:r>
-            <a:r>
-              <a:rPr lang="en-US" dirty="0" err="1">
-                <a:solidFill>
-                  <a:srgbClr val="FF0000"/>
-                </a:solidFill>
-              </a:rPr>
-              <a:t>opt_init_data</a:t>
-            </a:r>
-            <a:r>
-              <a:rPr lang="en-US" dirty="0">
-                <a:solidFill>
-                  <a:srgbClr val="FF0000"/>
-                </a:solidFill>
-              </a:rPr>
-              <a:t>()</a:t>
-            </a:r>
-          </a:p>
-          <a:p>
-            <a:pPr marL="342900" indent="-342900">
-              <a:buAutoNum type="arabicParenBoth"/>
-            </a:pPr>
-            <a:r>
-              <a:rPr lang="en-US" dirty="0">
-                <a:solidFill>
-                  <a:srgbClr val="FF0000"/>
-                </a:solidFill>
-              </a:rPr>
-              <a:t>Mem17, h3k9me, and general diffusion all do not work. </a:t>
-            </a:r>
-          </a:p>
-        </p:txBody>
-      </p:sp>
-      <p:sp>
-        <p:nvSpPr>
-          <p:cNvPr id="3" name="TextBox 2">
-            <a:extLst>
-              <a:ext uri="{FF2B5EF4-FFF2-40B4-BE49-F238E27FC236}">
-                <a16:creationId xmlns:a16="http://schemas.microsoft.com/office/drawing/2014/main" id="{23345994-C738-F043-B242-8F8DD14B5607}"/>
-              </a:ext>
-            </a:extLst>
-          </p:cNvPr>
-          <p:cNvSpPr txBox="1"/>
-          <p:nvPr/>
-        </p:nvSpPr>
-        <p:spPr>
-          <a:xfrm>
-            <a:off x="661183" y="2274838"/>
-            <a:ext cx="8145193" cy="2308324"/>
-          </a:xfrm>
-          <a:prstGeom prst="rect">
-            <a:avLst/>
-          </a:prstGeom>
-          <a:noFill/>
-        </p:spPr>
-        <p:txBody>
-          <a:bodyPr wrap="square" rtlCol="0">
-            <a:spAutoFit/>
-          </a:bodyPr>
-          <a:lstStyle/>
-          <a:p>
-            <a:r>
-              <a:rPr lang="en-US" dirty="0"/>
-              <a:t>&gt;&gt; test('general');</a:t>
-            </a:r>
-          </a:p>
-          <a:p>
-            <a:r>
-              <a:rPr lang="en-US" dirty="0"/>
-              <a:t>Function test() parameters: </a:t>
-            </a:r>
-          </a:p>
-          <a:p>
-            <a:r>
-              <a:rPr lang="en-US" dirty="0" err="1"/>
-              <a:t>init_u_tag</a:t>
-            </a:r>
-            <a:r>
-              <a:rPr lang="en-US" dirty="0"/>
-              <a:t> = 2</a:t>
-            </a:r>
-          </a:p>
-          <a:p>
-            <a:r>
-              <a:rPr lang="en-US" dirty="0" err="1"/>
-              <a:t>enable_normalize</a:t>
-            </a:r>
-            <a:r>
-              <a:rPr lang="en-US" dirty="0"/>
-              <a:t> = 1</a:t>
-            </a:r>
-          </a:p>
-          <a:p>
-            <a:r>
-              <a:rPr lang="en-US" dirty="0" err="1"/>
-              <a:t>enable_damp_newton</a:t>
-            </a:r>
-            <a:r>
-              <a:rPr lang="en-US" dirty="0"/>
-              <a:t> = 1</a:t>
-            </a:r>
-          </a:p>
-          <a:p>
-            <a:r>
-              <a:rPr lang="en-US" dirty="0"/>
-              <a:t>gamma = 1.00e-05</a:t>
-            </a:r>
-          </a:p>
-          <a:p>
-            <a:r>
-              <a:rPr lang="en-US" dirty="0" err="1"/>
-              <a:t>init_d</a:t>
-            </a:r>
-            <a:r>
-              <a:rPr lang="en-US" dirty="0"/>
-              <a:t> =  10.00</a:t>
-            </a:r>
-          </a:p>
-          <a:p>
-            <a:r>
-              <a:rPr lang="en-US" dirty="0"/>
-              <a:t>Function test(): Set </a:t>
-            </a:r>
-            <a:r>
-              <a:rPr lang="en-US" dirty="0" err="1"/>
-              <a:t>update_option</a:t>
-            </a:r>
-            <a:r>
-              <a:rPr lang="en-US" dirty="0"/>
-              <a:t> = 2 ---</a:t>
-            </a:r>
-          </a:p>
-        </p:txBody>
-      </p:sp>
-      <p:pic>
-        <p:nvPicPr>
-          <p:cNvPr id="5" name="Picture 4">
-            <a:extLst>
-              <a:ext uri="{FF2B5EF4-FFF2-40B4-BE49-F238E27FC236}">
-                <a16:creationId xmlns:a16="http://schemas.microsoft.com/office/drawing/2014/main" id="{5D2AF390-4C2E-C447-B980-2128B0208120}"/>
-              </a:ext>
-            </a:extLst>
-          </p:cNvPr>
-          <p:cNvPicPr>
-            <a:picLocks noChangeAspect="1"/>
-          </p:cNvPicPr>
-          <p:nvPr/>
-        </p:nvPicPr>
-        <p:blipFill rotWithShape="1">
-          <a:blip r:embed="rId3"/>
-          <a:srcRect t="52368"/>
-          <a:stretch/>
-        </p:blipFill>
-        <p:spPr>
-          <a:xfrm>
-            <a:off x="661183" y="4830518"/>
-            <a:ext cx="7231576" cy="1354382"/>
-          </a:xfrm>
-          <a:prstGeom prst="rect">
-            <a:avLst/>
-          </a:prstGeom>
-        </p:spPr>
-      </p:pic>
-      <p:sp>
-        <p:nvSpPr>
-          <p:cNvPr id="6" name="TextBox 5">
-            <a:extLst>
-              <a:ext uri="{FF2B5EF4-FFF2-40B4-BE49-F238E27FC236}">
-                <a16:creationId xmlns:a16="http://schemas.microsoft.com/office/drawing/2014/main" id="{03C16C12-E7BD-034F-B74B-2B9F208C8229}"/>
-              </a:ext>
-            </a:extLst>
-          </p:cNvPr>
-          <p:cNvSpPr txBox="1"/>
-          <p:nvPr/>
-        </p:nvSpPr>
-        <p:spPr>
-          <a:xfrm>
-            <a:off x="469900" y="6184900"/>
-            <a:ext cx="3352800" cy="369332"/>
-          </a:xfrm>
-          <a:prstGeom prst="rect">
-            <a:avLst/>
-          </a:prstGeom>
-          <a:noFill/>
-        </p:spPr>
-        <p:txBody>
-          <a:bodyPr wrap="square" rtlCol="0">
-            <a:spAutoFit/>
-          </a:bodyPr>
-          <a:lstStyle/>
-          <a:p>
-            <a:r>
-              <a:rPr lang="en-US" dirty="0"/>
-              <a:t>……</a:t>
-            </a:r>
-          </a:p>
-        </p:txBody>
-      </p:sp>
-    </p:spTree>
-    <p:extLst>
-      <p:ext uri="{BB962C8B-B14F-4D97-AF65-F5344CB8AC3E}">
-        <p14:creationId xmlns:p14="http://schemas.microsoft.com/office/powerpoint/2010/main" val="1227568197"/>
-      </p:ext>
-    </p:extLst>
-  </p:cSld>
-  <p:clrMapOvr>
-    <a:masterClrMapping/>
-  </p:clrMapOvr>
-</p:sld>
-</file>
-
-<file path=ppt/slides/slide15.xml><?xml version="1.0" encoding="utf-8"?>
-<p:sld xmlns:a="http://schemas.openxmlformats.org/drawingml/2006/main" xmlns:r="http://schemas.openxmlformats.org/officeDocument/2006/relationships" xmlns:p="http://schemas.openxmlformats.org/presentationml/2006/main">
-  <p:cSld>
-    <p:spTree>
-      <p:nvGrpSpPr>
-        <p:cNvPr id="1" name=""/>
-        <p:cNvGrpSpPr/>
-        <p:nvPr/>
-      </p:nvGrpSpPr>
-      <p:grpSpPr>
-        <a:xfrm>
-          <a:off x="0" y="0"/>
-          <a:ext cx="0" cy="0"/>
-          <a:chOff x="0" y="0"/>
-          <a:chExt cx="0" cy="0"/>
-        </a:xfrm>
-      </p:grpSpPr>
-      <p:sp>
-        <p:nvSpPr>
-          <p:cNvPr id="2" name="TextBox 1">
-            <a:extLst>
-              <a:ext uri="{FF2B5EF4-FFF2-40B4-BE49-F238E27FC236}">
-                <a16:creationId xmlns:a16="http://schemas.microsoft.com/office/drawing/2014/main" id="{25F0815D-E644-5642-8727-F848A86EEBA2}"/>
-              </a:ext>
-            </a:extLst>
-          </p:cNvPr>
-          <p:cNvSpPr txBox="1"/>
-          <p:nvPr/>
-        </p:nvSpPr>
-        <p:spPr>
-          <a:xfrm>
-            <a:off x="340242" y="308344"/>
-            <a:ext cx="4912242" cy="369332"/>
-          </a:xfrm>
-          <a:prstGeom prst="rect">
-            <a:avLst/>
-          </a:prstGeom>
-          <a:noFill/>
-        </p:spPr>
-        <p:txBody>
-          <a:bodyPr wrap="square" rtlCol="0">
-            <a:spAutoFit/>
-          </a:bodyPr>
-          <a:lstStyle/>
-          <a:p>
-            <a:r>
-              <a:rPr lang="en-US" dirty="0"/>
-              <a:t>Non constraint optimization also works</a:t>
-            </a:r>
-          </a:p>
-        </p:txBody>
-      </p:sp>
-      <p:sp>
-        <p:nvSpPr>
-          <p:cNvPr id="3" name="TextBox 2">
-            <a:extLst>
-              <a:ext uri="{FF2B5EF4-FFF2-40B4-BE49-F238E27FC236}">
-                <a16:creationId xmlns:a16="http://schemas.microsoft.com/office/drawing/2014/main" id="{09394CA7-1186-D94E-9EAA-F343B8ED1F64}"/>
-              </a:ext>
-            </a:extLst>
-          </p:cNvPr>
-          <p:cNvSpPr txBox="1"/>
-          <p:nvPr/>
-        </p:nvSpPr>
-        <p:spPr>
-          <a:xfrm>
-            <a:off x="340242" y="677676"/>
-            <a:ext cx="6772940" cy="2862322"/>
-          </a:xfrm>
-          <a:prstGeom prst="rect">
-            <a:avLst/>
-          </a:prstGeom>
-          <a:noFill/>
-        </p:spPr>
-        <p:txBody>
-          <a:bodyPr wrap="square" rtlCol="0">
-            <a:spAutoFit/>
-          </a:bodyPr>
-          <a:lstStyle/>
-          <a:p>
-            <a:r>
-              <a:rPr lang="en-US" sz="1200" dirty="0"/>
-              <a:t>&gt;&gt; test(1);</a:t>
-            </a:r>
-          </a:p>
-          <a:p>
-            <a:r>
-              <a:rPr lang="en-US" sz="1200" dirty="0"/>
-              <a:t>Function test() parameters: </a:t>
-            </a:r>
-          </a:p>
-          <a:p>
-            <a:r>
-              <a:rPr lang="en-US" sz="1200" dirty="0" err="1"/>
-              <a:t>init_u_tag</a:t>
-            </a:r>
-            <a:r>
-              <a:rPr lang="en-US" sz="1200" dirty="0"/>
-              <a:t> = 1</a:t>
-            </a:r>
-          </a:p>
-          <a:p>
-            <a:r>
-              <a:rPr lang="en-US" sz="1200" dirty="0" err="1"/>
-              <a:t>enable_normalize</a:t>
-            </a:r>
-            <a:r>
-              <a:rPr lang="en-US" sz="1200" dirty="0"/>
-              <a:t> = 0</a:t>
-            </a:r>
-          </a:p>
-          <a:p>
-            <a:r>
-              <a:rPr lang="en-US" sz="1200" dirty="0" err="1"/>
-              <a:t>enable_damp_newton</a:t>
-            </a:r>
-            <a:r>
-              <a:rPr lang="en-US" sz="1200" dirty="0"/>
-              <a:t> = 0</a:t>
-            </a:r>
-          </a:p>
-          <a:p>
-            <a:r>
-              <a:rPr lang="en-US" sz="1200" dirty="0"/>
-              <a:t>gamma = 1.00e-05</a:t>
-            </a:r>
-          </a:p>
-          <a:p>
-            <a:r>
-              <a:rPr lang="en-US" sz="1200" dirty="0" err="1"/>
-              <a:t>init_d</a:t>
-            </a:r>
-            <a:r>
-              <a:rPr lang="en-US" sz="1200" dirty="0"/>
-              <a:t> =  10.00</a:t>
-            </a:r>
-          </a:p>
-          <a:p>
-            <a:r>
-              <a:rPr lang="en-US" sz="1200" dirty="0"/>
-              <a:t>Function test(): Set </a:t>
-            </a:r>
-            <a:r>
-              <a:rPr lang="en-US" sz="1200" dirty="0" err="1"/>
-              <a:t>update_option</a:t>
-            </a:r>
-            <a:r>
-              <a:rPr lang="en-US" sz="1200" dirty="0"/>
-              <a:t> = 1 ---</a:t>
-            </a:r>
-          </a:p>
-          <a:p>
-            <a:r>
-              <a:rPr lang="en-US" sz="1200" dirty="0" err="1"/>
-              <a:t>Obj</a:t>
-            </a:r>
-            <a:r>
-              <a:rPr lang="en-US" sz="1200" dirty="0"/>
-              <a:t> </a:t>
-            </a:r>
-            <a:r>
-              <a:rPr lang="en-US" sz="1200" dirty="0" err="1"/>
-              <a:t>Func</a:t>
-            </a:r>
-            <a:r>
-              <a:rPr lang="en-US" sz="1200" dirty="0"/>
-              <a:t> 	 Norm J 	 Damping 	 Residual 	 x_0</a:t>
-            </a:r>
-          </a:p>
-          <a:p>
-            <a:r>
-              <a:rPr lang="en-US" sz="1200" dirty="0"/>
-              <a:t>6.900e+01 	  1.600e+01 	 0.00e+00 	 1.00e+01 	 10 </a:t>
-            </a:r>
-          </a:p>
-          <a:p>
-            <a:r>
-              <a:rPr lang="en-US" sz="1200" dirty="0"/>
-              <a:t>5.000e+00 	  0.000e+00 	 1.00e+00 	 0.00e+00 	 2 </a:t>
-            </a:r>
-          </a:p>
-          <a:p>
-            <a:r>
-              <a:rPr lang="en-US" sz="1200" dirty="0"/>
-              <a:t>Number of newton steps: 1 </a:t>
-            </a:r>
-          </a:p>
-          <a:p>
-            <a:r>
-              <a:rPr lang="en-US" sz="1200" dirty="0"/>
-              <a:t>######################## </a:t>
-            </a:r>
-          </a:p>
-          <a:p>
-            <a:endParaRPr lang="en-US" sz="1200" dirty="0"/>
-          </a:p>
-          <a:p>
-            <a:r>
-              <a:rPr lang="en-US" sz="1200" dirty="0"/>
-              <a:t>Elapsed time is 0.011152 seconds.</a:t>
-            </a:r>
-          </a:p>
-        </p:txBody>
-      </p:sp>
-    </p:spTree>
-    <p:extLst>
-      <p:ext uri="{BB962C8B-B14F-4D97-AF65-F5344CB8AC3E}">
-        <p14:creationId xmlns:p14="http://schemas.microsoft.com/office/powerpoint/2010/main" val="3426677151"/>
-      </p:ext>
-    </p:extLst>
-  </p:cSld>
-  <p:clrMapOvr>
-    <a:masterClrMapping/>
-  </p:clrMapOvr>
-</p:sld>
-</file>
-
-<file path=ppt/slides/slide16.xml><?xml version="1.0" encoding="utf-8"?>
-<p:sld xmlns:a="http://schemas.openxmlformats.org/drawingml/2006/main" xmlns:r="http://schemas.openxmlformats.org/officeDocument/2006/relationships" xmlns:p="http://schemas.openxmlformats.org/presentationml/2006/main">
-  <p:cSld>
-    <p:spTree>
-      <p:nvGrpSpPr>
-        <p:cNvPr id="1" name=""/>
-        <p:cNvGrpSpPr/>
-        <p:nvPr/>
-      </p:nvGrpSpPr>
-      <p:grpSpPr>
-        <a:xfrm>
-          <a:off x="0" y="0"/>
-          <a:ext cx="0" cy="0"/>
-          <a:chOff x="0" y="0"/>
-          <a:chExt cx="0" cy="0"/>
-        </a:xfrm>
-      </p:grpSpPr>
-      <p:sp>
-        <p:nvSpPr>
           <p:cNvPr id="2" name="Rectangle 1">
             <a:extLst>
               <a:ext uri="{FF2B5EF4-FFF2-40B4-BE49-F238E27FC236}">
@@ -5704,7 +4736,7 @@
     </p:spTree>
     <p:extLst>
       <p:ext uri="{BB962C8B-B14F-4D97-AF65-F5344CB8AC3E}">
-        <p14:creationId xmlns:p14="http://schemas.microsoft.com/office/powerpoint/2010/main" val="2739442666"/>
+        <p14:creationId xmlns:p14="http://schemas.microsoft.com/office/powerpoint/2010/main" val="1744456059"/>
       </p:ext>
     </p:extLst>
   </p:cSld>
@@ -7731,10 +6763,9 @@
           </a:p>
           <a:p>
             <a:r>
-              <a:rPr lang="it" sz="1200"/>
+              <a:rPr lang="it" sz="1200" dirty="0"/>
               <a:t>######################## </a:t>
             </a:r>
-            <a:endParaRPr lang="it" sz="1200" dirty="0"/>
           </a:p>
           <a:p>
             <a:r>

</xml_diff>